<commit_message>
FIX: Se actualiza la presentación general
</commit_message>
<xml_diff>
--- a/BIS presentacion.pptx
+++ b/BIS presentacion.pptx
@@ -6,13 +6,13 @@
   </p:sldMasterIdLst>
   <p:sldIdLst>
     <p:sldId id="256" r:id="rId2"/>
-    <p:sldId id="257" r:id="rId3"/>
-    <p:sldId id="275" r:id="rId4"/>
-    <p:sldId id="263" r:id="rId5"/>
-    <p:sldId id="274" r:id="rId6"/>
-    <p:sldId id="258" r:id="rId7"/>
-    <p:sldId id="260" r:id="rId8"/>
-    <p:sldId id="259" r:id="rId9"/>
+    <p:sldId id="284" r:id="rId3"/>
+    <p:sldId id="257" r:id="rId4"/>
+    <p:sldId id="275" r:id="rId5"/>
+    <p:sldId id="258" r:id="rId6"/>
+    <p:sldId id="260" r:id="rId7"/>
+    <p:sldId id="259" r:id="rId8"/>
+    <p:sldId id="273" r:id="rId9"/>
     <p:sldId id="271" r:id="rId10"/>
     <p:sldId id="264" r:id="rId11"/>
     <p:sldId id="265" r:id="rId12"/>
@@ -21,16 +21,17 @@
     <p:sldId id="269" r:id="rId15"/>
     <p:sldId id="268" r:id="rId16"/>
     <p:sldId id="270" r:id="rId17"/>
-    <p:sldId id="273" r:id="rId18"/>
-    <p:sldId id="272" r:id="rId19"/>
+    <p:sldId id="272" r:id="rId18"/>
+    <p:sldId id="286" r:id="rId19"/>
     <p:sldId id="276" r:id="rId20"/>
     <p:sldId id="277" r:id="rId21"/>
     <p:sldId id="278" r:id="rId22"/>
     <p:sldId id="279" r:id="rId23"/>
     <p:sldId id="280" r:id="rId24"/>
-    <p:sldId id="281" r:id="rId25"/>
+    <p:sldId id="283" r:id="rId25"/>
     <p:sldId id="282" r:id="rId26"/>
-    <p:sldId id="283" r:id="rId27"/>
+    <p:sldId id="281" r:id="rId27"/>
+    <p:sldId id="285" r:id="rId28"/>
   </p:sldIdLst>
   <p:sldSz cx="12192000" cy="6858000"/>
   <p:notesSz cx="6858000" cy="9144000"/>
@@ -194,7 +195,7 @@
           <a:noFill/>
           <a:extLst>
             <a:ext uri="{909E8E84-426E-40dd-AFC4-6F175D3DCCD1}">
-              <a14:hiddenFill xmlns="" xmlns:a14="http://schemas.microsoft.com/office/drawing/2010/main">
+              <a14:hiddenFill xmlns:a14="http://schemas.microsoft.com/office/drawing/2010/main" xmlns="">
                 <a:solidFill>
                   <a:srgbClr val="FFFFFF"/>
                 </a:solidFill>
@@ -253,7 +254,7 @@
             </a:ln>
             <a:extLst>
               <a:ext uri="{91240B29-F687-4f45-9708-019B960494DF}">
-                <a14:hiddenLine xmlns="" xmlns:a14="http://schemas.microsoft.com/office/drawing/2010/main" w="9525">
+                <a14:hiddenLine xmlns:a14="http://schemas.microsoft.com/office/drawing/2010/main" xmlns="" w="9525">
                   <a:solidFill>
                     <a:srgbClr val="000000"/>
                   </a:solidFill>
@@ -343,7 +344,7 @@
             </a:ln>
             <a:extLst>
               <a:ext uri="{91240B29-F687-4f45-9708-019B960494DF}">
-                <a14:hiddenLine xmlns="" xmlns:a14="http://schemas.microsoft.com/office/drawing/2010/main" w="9525">
+                <a14:hiddenLine xmlns:a14="http://schemas.microsoft.com/office/drawing/2010/main" xmlns="" w="9525">
                   <a:solidFill>
                     <a:srgbClr val="000000"/>
                   </a:solidFill>
@@ -433,7 +434,7 @@
             </a:ln>
             <a:extLst>
               <a:ext uri="{91240B29-F687-4f45-9708-019B960494DF}">
-                <a14:hiddenLine xmlns="" xmlns:a14="http://schemas.microsoft.com/office/drawing/2010/main" w="9525">
+                <a14:hiddenLine xmlns:a14="http://schemas.microsoft.com/office/drawing/2010/main" xmlns="" w="9525">
                   <a:solidFill>
                     <a:srgbClr val="000000"/>
                   </a:solidFill>
@@ -467,7 +468,7 @@
             </a:ln>
             <a:extLst>
               <a:ext uri="{91240B29-F687-4f45-9708-019B960494DF}">
-                <a14:hiddenLine xmlns="" xmlns:a14="http://schemas.microsoft.com/office/drawing/2010/main" w="9525">
+                <a14:hiddenLine xmlns:a14="http://schemas.microsoft.com/office/drawing/2010/main" xmlns="" w="9525">
                   <a:solidFill>
                     <a:srgbClr val="000000"/>
                   </a:solidFill>
@@ -557,7 +558,7 @@
             </a:ln>
             <a:extLst>
               <a:ext uri="{91240B29-F687-4f45-9708-019B960494DF}">
-                <a14:hiddenLine xmlns="" xmlns:a14="http://schemas.microsoft.com/office/drawing/2010/main" w="9525">
+                <a14:hiddenLine xmlns:a14="http://schemas.microsoft.com/office/drawing/2010/main" xmlns="" w="9525">
                   <a:solidFill>
                     <a:srgbClr val="000000"/>
                   </a:solidFill>
@@ -619,7 +620,7 @@
             </a:ln>
             <a:extLst>
               <a:ext uri="{91240B29-F687-4f45-9708-019B960494DF}">
-                <a14:hiddenLine xmlns="" xmlns:a14="http://schemas.microsoft.com/office/drawing/2010/main" w="9525">
+                <a14:hiddenLine xmlns:a14="http://schemas.microsoft.com/office/drawing/2010/main" xmlns="" w="9525">
                   <a:solidFill>
                     <a:srgbClr val="000000"/>
                   </a:solidFill>
@@ -681,7 +682,7 @@
             </a:ln>
             <a:extLst>
               <a:ext uri="{91240B29-F687-4f45-9708-019B960494DF}">
-                <a14:hiddenLine xmlns="" xmlns:a14="http://schemas.microsoft.com/office/drawing/2010/main" w="9525">
+                <a14:hiddenLine xmlns:a14="http://schemas.microsoft.com/office/drawing/2010/main" xmlns="" w="9525">
                   <a:solidFill>
                     <a:srgbClr val="000000"/>
                   </a:solidFill>
@@ -771,7 +772,7 @@
             </a:ln>
             <a:extLst>
               <a:ext uri="{91240B29-F687-4f45-9708-019B960494DF}">
-                <a14:hiddenLine xmlns="" xmlns:a14="http://schemas.microsoft.com/office/drawing/2010/main" w="9525">
+                <a14:hiddenLine xmlns:a14="http://schemas.microsoft.com/office/drawing/2010/main" xmlns="" w="9525">
                   <a:solidFill>
                     <a:srgbClr val="000000"/>
                   </a:solidFill>
@@ -833,7 +834,7 @@
             </a:ln>
             <a:extLst>
               <a:ext uri="{91240B29-F687-4f45-9708-019B960494DF}">
-                <a14:hiddenLine xmlns="" xmlns:a14="http://schemas.microsoft.com/office/drawing/2010/main" w="9525">
+                <a14:hiddenLine xmlns:a14="http://schemas.microsoft.com/office/drawing/2010/main" xmlns="" w="9525">
                   <a:solidFill>
                     <a:srgbClr val="000000"/>
                   </a:solidFill>
@@ -895,7 +896,7 @@
             </a:ln>
             <a:extLst>
               <a:ext uri="{91240B29-F687-4f45-9708-019B960494DF}">
-                <a14:hiddenLine xmlns="" xmlns:a14="http://schemas.microsoft.com/office/drawing/2010/main" w="9525">
+                <a14:hiddenLine xmlns:a14="http://schemas.microsoft.com/office/drawing/2010/main" xmlns="" w="9525">
                   <a:solidFill>
                     <a:srgbClr val="000000"/>
                   </a:solidFill>
@@ -985,7 +986,7 @@
             </a:ln>
             <a:extLst>
               <a:ext uri="{91240B29-F687-4f45-9708-019B960494DF}">
-                <a14:hiddenLine xmlns="" xmlns:a14="http://schemas.microsoft.com/office/drawing/2010/main" w="9525">
+                <a14:hiddenLine xmlns:a14="http://schemas.microsoft.com/office/drawing/2010/main" xmlns="" w="9525">
                   <a:solidFill>
                     <a:srgbClr val="000000"/>
                   </a:solidFill>
@@ -1075,7 +1076,7 @@
             </a:ln>
             <a:extLst>
               <a:ext uri="{91240B29-F687-4f45-9708-019B960494DF}">
-                <a14:hiddenLine xmlns="" xmlns:a14="http://schemas.microsoft.com/office/drawing/2010/main" w="9525">
+                <a14:hiddenLine xmlns:a14="http://schemas.microsoft.com/office/drawing/2010/main" xmlns="" w="9525">
                   <a:solidFill>
                     <a:srgbClr val="000000"/>
                   </a:solidFill>
@@ -1137,7 +1138,7 @@
             </a:ln>
             <a:extLst>
               <a:ext uri="{91240B29-F687-4f45-9708-019B960494DF}">
-                <a14:hiddenLine xmlns="" xmlns:a14="http://schemas.microsoft.com/office/drawing/2010/main" w="9525">
+                <a14:hiddenLine xmlns:a14="http://schemas.microsoft.com/office/drawing/2010/main" xmlns="" w="9525">
                   <a:solidFill>
                     <a:srgbClr val="000000"/>
                   </a:solidFill>
@@ -1247,7 +1248,7 @@
             </a:ln>
             <a:extLst>
               <a:ext uri="{91240B29-F687-4f45-9708-019B960494DF}">
-                <a14:hiddenLine xmlns="" xmlns:a14="http://schemas.microsoft.com/office/drawing/2010/main" w="9525">
+                <a14:hiddenLine xmlns:a14="http://schemas.microsoft.com/office/drawing/2010/main" xmlns="" w="9525">
                   <a:solidFill>
                     <a:srgbClr val="000000"/>
                   </a:solidFill>
@@ -1309,7 +1310,7 @@
             </a:ln>
             <a:extLst>
               <a:ext uri="{91240B29-F687-4f45-9708-019B960494DF}">
-                <a14:hiddenLine xmlns="" xmlns:a14="http://schemas.microsoft.com/office/drawing/2010/main" w="9525">
+                <a14:hiddenLine xmlns:a14="http://schemas.microsoft.com/office/drawing/2010/main" xmlns="" w="9525">
                   <a:solidFill>
                     <a:srgbClr val="000000"/>
                   </a:solidFill>
@@ -1399,7 +1400,7 @@
             </a:ln>
             <a:extLst>
               <a:ext uri="{91240B29-F687-4f45-9708-019B960494DF}">
-                <a14:hiddenLine xmlns="" xmlns:a14="http://schemas.microsoft.com/office/drawing/2010/main" w="9525">
+                <a14:hiddenLine xmlns:a14="http://schemas.microsoft.com/office/drawing/2010/main" xmlns="" w="9525">
                   <a:solidFill>
                     <a:srgbClr val="000000"/>
                   </a:solidFill>
@@ -1489,7 +1490,7 @@
             </a:ln>
             <a:extLst>
               <a:ext uri="{91240B29-F687-4f45-9708-019B960494DF}">
-                <a14:hiddenLine xmlns="" xmlns:a14="http://schemas.microsoft.com/office/drawing/2010/main" w="9525">
+                <a14:hiddenLine xmlns:a14="http://schemas.microsoft.com/office/drawing/2010/main" xmlns="" w="9525">
                   <a:solidFill>
                     <a:srgbClr val="000000"/>
                   </a:solidFill>
@@ -1551,7 +1552,7 @@
             </a:ln>
             <a:extLst>
               <a:ext uri="{91240B29-F687-4f45-9708-019B960494DF}">
-                <a14:hiddenLine xmlns="" xmlns:a14="http://schemas.microsoft.com/office/drawing/2010/main" w="9525">
+                <a14:hiddenLine xmlns:a14="http://schemas.microsoft.com/office/drawing/2010/main" xmlns="" w="9525">
                   <a:solidFill>
                     <a:srgbClr val="000000"/>
                   </a:solidFill>
@@ -1641,7 +1642,7 @@
             </a:ln>
             <a:extLst>
               <a:ext uri="{91240B29-F687-4f45-9708-019B960494DF}">
-                <a14:hiddenLine xmlns="" xmlns:a14="http://schemas.microsoft.com/office/drawing/2010/main" w="9525">
+                <a14:hiddenLine xmlns:a14="http://schemas.microsoft.com/office/drawing/2010/main" xmlns="" w="9525">
                   <a:solidFill>
                     <a:srgbClr val="000000"/>
                   </a:solidFill>
@@ -1731,7 +1732,7 @@
             </a:ln>
             <a:extLst>
               <a:ext uri="{91240B29-F687-4f45-9708-019B960494DF}">
-                <a14:hiddenLine xmlns="" xmlns:a14="http://schemas.microsoft.com/office/drawing/2010/main" w="9525">
+                <a14:hiddenLine xmlns:a14="http://schemas.microsoft.com/office/drawing/2010/main" xmlns="" w="9525">
                   <a:solidFill>
                     <a:srgbClr val="000000"/>
                   </a:solidFill>
@@ -1787,7 +1788,7 @@
             </a:ln>
             <a:extLst>
               <a:ext uri="{91240B29-F687-4f45-9708-019B960494DF}">
-                <a14:hiddenLine xmlns="" xmlns:a14="http://schemas.microsoft.com/office/drawing/2010/main" w="9525">
+                <a14:hiddenLine xmlns:a14="http://schemas.microsoft.com/office/drawing/2010/main" xmlns="" w="9525">
                   <a:solidFill>
                     <a:srgbClr val="000000"/>
                   </a:solidFill>
@@ -1877,7 +1878,7 @@
             </a:ln>
             <a:extLst>
               <a:ext uri="{91240B29-F687-4f45-9708-019B960494DF}">
-                <a14:hiddenLine xmlns="" xmlns:a14="http://schemas.microsoft.com/office/drawing/2010/main" w="9525">
+                <a14:hiddenLine xmlns:a14="http://schemas.microsoft.com/office/drawing/2010/main" xmlns="" w="9525">
                   <a:solidFill>
                     <a:srgbClr val="000000"/>
                   </a:solidFill>
@@ -1933,7 +1934,7 @@
             </a:ln>
             <a:extLst>
               <a:ext uri="{91240B29-F687-4f45-9708-019B960494DF}">
-                <a14:hiddenLine xmlns="" xmlns:a14="http://schemas.microsoft.com/office/drawing/2010/main" w="9525">
+                <a14:hiddenLine xmlns:a14="http://schemas.microsoft.com/office/drawing/2010/main" xmlns="" w="9525">
                   <a:solidFill>
                     <a:srgbClr val="000000"/>
                   </a:solidFill>
@@ -2023,7 +2024,7 @@
             </a:ln>
             <a:extLst>
               <a:ext uri="{91240B29-F687-4f45-9708-019B960494DF}">
-                <a14:hiddenLine xmlns="" xmlns:a14="http://schemas.microsoft.com/office/drawing/2010/main" w="9525">
+                <a14:hiddenLine xmlns:a14="http://schemas.microsoft.com/office/drawing/2010/main" xmlns="" w="9525">
                   <a:solidFill>
                     <a:srgbClr val="000000"/>
                   </a:solidFill>
@@ -2091,7 +2092,7 @@
             </a:ln>
             <a:extLst>
               <a:ext uri="{91240B29-F687-4f45-9708-019B960494DF}">
-                <a14:hiddenLine xmlns="" xmlns:a14="http://schemas.microsoft.com/office/drawing/2010/main" w="9525">
+                <a14:hiddenLine xmlns:a14="http://schemas.microsoft.com/office/drawing/2010/main" xmlns="" w="9525">
                   <a:solidFill>
                     <a:srgbClr val="000000"/>
                   </a:solidFill>
@@ -2181,7 +2182,7 @@
             </a:ln>
             <a:extLst>
               <a:ext uri="{91240B29-F687-4f45-9708-019B960494DF}">
-                <a14:hiddenLine xmlns="" xmlns:a14="http://schemas.microsoft.com/office/drawing/2010/main" w="9525">
+                <a14:hiddenLine xmlns:a14="http://schemas.microsoft.com/office/drawing/2010/main" xmlns="" w="9525">
                   <a:solidFill>
                     <a:srgbClr val="000000"/>
                   </a:solidFill>
@@ -2249,7 +2250,7 @@
             </a:ln>
             <a:extLst>
               <a:ext uri="{91240B29-F687-4f45-9708-019B960494DF}">
-                <a14:hiddenLine xmlns="" xmlns:a14="http://schemas.microsoft.com/office/drawing/2010/main" w="9525">
+                <a14:hiddenLine xmlns:a14="http://schemas.microsoft.com/office/drawing/2010/main" xmlns="" w="9525">
                   <a:solidFill>
                     <a:srgbClr val="000000"/>
                   </a:solidFill>
@@ -2339,7 +2340,7 @@
             </a:ln>
             <a:extLst>
               <a:ext uri="{91240B29-F687-4f45-9708-019B960494DF}">
-                <a14:hiddenLine xmlns="" xmlns:a14="http://schemas.microsoft.com/office/drawing/2010/main" w="9525">
+                <a14:hiddenLine xmlns:a14="http://schemas.microsoft.com/office/drawing/2010/main" xmlns="" w="9525">
                   <a:solidFill>
                     <a:srgbClr val="000000"/>
                   </a:solidFill>
@@ -2373,7 +2374,7 @@
             </a:ln>
             <a:extLst>
               <a:ext uri="{91240B29-F687-4f45-9708-019B960494DF}">
-                <a14:hiddenLine xmlns="" xmlns:a14="http://schemas.microsoft.com/office/drawing/2010/main" w="9525">
+                <a14:hiddenLine xmlns:a14="http://schemas.microsoft.com/office/drawing/2010/main" xmlns="" w="9525">
                   <a:solidFill>
                     <a:srgbClr val="000000"/>
                   </a:solidFill>
@@ -2463,7 +2464,7 @@
             </a:ln>
             <a:extLst>
               <a:ext uri="{91240B29-F687-4f45-9708-019B960494DF}">
-                <a14:hiddenLine xmlns="" xmlns:a14="http://schemas.microsoft.com/office/drawing/2010/main" w="9525">
+                <a14:hiddenLine xmlns:a14="http://schemas.microsoft.com/office/drawing/2010/main" xmlns="" w="9525">
                   <a:solidFill>
                     <a:srgbClr val="000000"/>
                   </a:solidFill>
@@ -2525,7 +2526,7 @@
             </a:ln>
             <a:extLst>
               <a:ext uri="{91240B29-F687-4f45-9708-019B960494DF}">
-                <a14:hiddenLine xmlns="" xmlns:a14="http://schemas.microsoft.com/office/drawing/2010/main" w="9525">
+                <a14:hiddenLine xmlns:a14="http://schemas.microsoft.com/office/drawing/2010/main" xmlns="" w="9525">
                   <a:solidFill>
                     <a:srgbClr val="000000"/>
                   </a:solidFill>
@@ -2587,7 +2588,7 @@
             </a:ln>
             <a:extLst>
               <a:ext uri="{91240B29-F687-4f45-9708-019B960494DF}">
-                <a14:hiddenLine xmlns="" xmlns:a14="http://schemas.microsoft.com/office/drawing/2010/main" w="9525">
+                <a14:hiddenLine xmlns:a14="http://schemas.microsoft.com/office/drawing/2010/main" xmlns="" w="9525">
                   <a:solidFill>
                     <a:srgbClr val="000000"/>
                   </a:solidFill>
@@ -2677,7 +2678,7 @@
             </a:ln>
             <a:extLst>
               <a:ext uri="{91240B29-F687-4f45-9708-019B960494DF}">
-                <a14:hiddenLine xmlns="" xmlns:a14="http://schemas.microsoft.com/office/drawing/2010/main" w="9525">
+                <a14:hiddenLine xmlns:a14="http://schemas.microsoft.com/office/drawing/2010/main" xmlns="" w="9525">
                   <a:solidFill>
                     <a:srgbClr val="000000"/>
                   </a:solidFill>
@@ -2745,7 +2746,7 @@
             </a:ln>
             <a:extLst>
               <a:ext uri="{91240B29-F687-4f45-9708-019B960494DF}">
-                <a14:hiddenLine xmlns="" xmlns:a14="http://schemas.microsoft.com/office/drawing/2010/main" w="9525">
+                <a14:hiddenLine xmlns:a14="http://schemas.microsoft.com/office/drawing/2010/main" xmlns="" w="9525">
                   <a:solidFill>
                     <a:srgbClr val="000000"/>
                   </a:solidFill>
@@ -2807,7 +2808,7 @@
             </a:ln>
             <a:extLst>
               <a:ext uri="{91240B29-F687-4f45-9708-019B960494DF}">
-                <a14:hiddenLine xmlns="" xmlns:a14="http://schemas.microsoft.com/office/drawing/2010/main" w="9525">
+                <a14:hiddenLine xmlns:a14="http://schemas.microsoft.com/office/drawing/2010/main" xmlns="" w="9525">
                   <a:solidFill>
                     <a:srgbClr val="000000"/>
                   </a:solidFill>
@@ -2897,7 +2898,7 @@
             </a:ln>
             <a:extLst>
               <a:ext uri="{91240B29-F687-4f45-9708-019B960494DF}">
-                <a14:hiddenLine xmlns="" xmlns:a14="http://schemas.microsoft.com/office/drawing/2010/main" w="9525">
+                <a14:hiddenLine xmlns:a14="http://schemas.microsoft.com/office/drawing/2010/main" xmlns="" w="9525">
                   <a:solidFill>
                     <a:srgbClr val="000000"/>
                   </a:solidFill>
@@ -2959,7 +2960,7 @@
             </a:ln>
             <a:extLst>
               <a:ext uri="{91240B29-F687-4f45-9708-019B960494DF}">
-                <a14:hiddenLine xmlns="" xmlns:a14="http://schemas.microsoft.com/office/drawing/2010/main" w="9525">
+                <a14:hiddenLine xmlns:a14="http://schemas.microsoft.com/office/drawing/2010/main" xmlns="" w="9525">
                   <a:solidFill>
                     <a:srgbClr val="000000"/>
                   </a:solidFill>
@@ -3049,7 +3050,7 @@
             </a:ln>
             <a:extLst>
               <a:ext uri="{91240B29-F687-4f45-9708-019B960494DF}">
-                <a14:hiddenLine xmlns="" xmlns:a14="http://schemas.microsoft.com/office/drawing/2010/main" w="9525">
+                <a14:hiddenLine xmlns:a14="http://schemas.microsoft.com/office/drawing/2010/main" xmlns="" w="9525">
                   <a:solidFill>
                     <a:srgbClr val="000000"/>
                   </a:solidFill>
@@ -3111,7 +3112,7 @@
             </a:ln>
             <a:extLst>
               <a:ext uri="{91240B29-F687-4f45-9708-019B960494DF}">
-                <a14:hiddenLine xmlns="" xmlns:a14="http://schemas.microsoft.com/office/drawing/2010/main" w="9525">
+                <a14:hiddenLine xmlns:a14="http://schemas.microsoft.com/office/drawing/2010/main" xmlns="" w="9525">
                   <a:solidFill>
                     <a:srgbClr val="000000"/>
                   </a:solidFill>
@@ -3201,7 +3202,7 @@
             </a:ln>
             <a:extLst>
               <a:ext uri="{91240B29-F687-4f45-9708-019B960494DF}">
-                <a14:hiddenLine xmlns="" xmlns:a14="http://schemas.microsoft.com/office/drawing/2010/main" w="9525">
+                <a14:hiddenLine xmlns:a14="http://schemas.microsoft.com/office/drawing/2010/main" xmlns="" w="9525">
                   <a:solidFill>
                     <a:srgbClr val="000000"/>
                   </a:solidFill>
@@ -3235,7 +3236,7 @@
             </a:ln>
             <a:extLst>
               <a:ext uri="{91240B29-F687-4f45-9708-019B960494DF}">
-                <a14:hiddenLine xmlns="" xmlns:a14="http://schemas.microsoft.com/office/drawing/2010/main" w="9525">
+                <a14:hiddenLine xmlns:a14="http://schemas.microsoft.com/office/drawing/2010/main" xmlns="" w="9525">
                   <a:solidFill>
                     <a:srgbClr val="000000"/>
                   </a:solidFill>
@@ -3300,7 +3301,7 @@
             </a:ln>
             <a:extLst>
               <a:ext uri="{91240B29-F687-4f45-9708-019B960494DF}">
-                <a14:hiddenLine xmlns="" xmlns:a14="http://schemas.microsoft.com/office/drawing/2010/main" w="9525">
+                <a14:hiddenLine xmlns:a14="http://schemas.microsoft.com/office/drawing/2010/main" xmlns="" w="9525">
                   <a:solidFill>
                     <a:srgbClr val="000000"/>
                   </a:solidFill>
@@ -3390,7 +3391,7 @@
             </a:ln>
             <a:extLst>
               <a:ext uri="{91240B29-F687-4f45-9708-019B960494DF}">
-                <a14:hiddenLine xmlns="" xmlns:a14="http://schemas.microsoft.com/office/drawing/2010/main" w="9525">
+                <a14:hiddenLine xmlns:a14="http://schemas.microsoft.com/office/drawing/2010/main" xmlns="" w="9525">
                   <a:solidFill>
                     <a:srgbClr val="000000"/>
                   </a:solidFill>
@@ -3452,7 +3453,7 @@
             </a:ln>
             <a:extLst>
               <a:ext uri="{91240B29-F687-4f45-9708-019B960494DF}">
-                <a14:hiddenLine xmlns="" xmlns:a14="http://schemas.microsoft.com/office/drawing/2010/main" w="9525">
+                <a14:hiddenLine xmlns:a14="http://schemas.microsoft.com/office/drawing/2010/main" xmlns="" w="9525">
                   <a:solidFill>
                     <a:srgbClr val="000000"/>
                   </a:solidFill>
@@ -3542,7 +3543,7 @@
             </a:ln>
             <a:extLst>
               <a:ext uri="{91240B29-F687-4f45-9708-019B960494DF}">
-                <a14:hiddenLine xmlns="" xmlns:a14="http://schemas.microsoft.com/office/drawing/2010/main" w="9525">
+                <a14:hiddenLine xmlns:a14="http://schemas.microsoft.com/office/drawing/2010/main" xmlns="" w="9525">
                   <a:solidFill>
                     <a:srgbClr val="000000"/>
                   </a:solidFill>
@@ -3632,7 +3633,7 @@
             </a:ln>
             <a:extLst>
               <a:ext uri="{91240B29-F687-4f45-9708-019B960494DF}">
-                <a14:hiddenLine xmlns="" xmlns:a14="http://schemas.microsoft.com/office/drawing/2010/main" w="9525">
+                <a14:hiddenLine xmlns:a14="http://schemas.microsoft.com/office/drawing/2010/main" xmlns="" w="9525">
                   <a:solidFill>
                     <a:srgbClr val="000000"/>
                   </a:solidFill>
@@ -3697,7 +3698,7 @@
             </a:ln>
             <a:extLst>
               <a:ext uri="{91240B29-F687-4f45-9708-019B960494DF}">
-                <a14:hiddenLine xmlns="" xmlns:a14="http://schemas.microsoft.com/office/drawing/2010/main" w="9525">
+                <a14:hiddenLine xmlns:a14="http://schemas.microsoft.com/office/drawing/2010/main" xmlns="" w="9525">
                   <a:solidFill>
                     <a:srgbClr val="000000"/>
                   </a:solidFill>
@@ -3759,7 +3760,7 @@
             </a:ln>
             <a:extLst>
               <a:ext uri="{91240B29-F687-4f45-9708-019B960494DF}">
-                <a14:hiddenLine xmlns="" xmlns:a14="http://schemas.microsoft.com/office/drawing/2010/main" w="9525">
+                <a14:hiddenLine xmlns:a14="http://schemas.microsoft.com/office/drawing/2010/main" xmlns="" w="9525">
                   <a:solidFill>
                     <a:srgbClr val="000000"/>
                   </a:solidFill>
@@ -3849,7 +3850,7 @@
             </a:ln>
             <a:extLst>
               <a:ext uri="{91240B29-F687-4f45-9708-019B960494DF}">
-                <a14:hiddenLine xmlns="" xmlns:a14="http://schemas.microsoft.com/office/drawing/2010/main" w="9525">
+                <a14:hiddenLine xmlns:a14="http://schemas.microsoft.com/office/drawing/2010/main" xmlns="" w="9525">
                   <a:solidFill>
                     <a:srgbClr val="000000"/>
                   </a:solidFill>
@@ -3939,7 +3940,7 @@
             </a:ln>
             <a:extLst>
               <a:ext uri="{91240B29-F687-4f45-9708-019B960494DF}">
-                <a14:hiddenLine xmlns="" xmlns:a14="http://schemas.microsoft.com/office/drawing/2010/main" w="9525">
+                <a14:hiddenLine xmlns:a14="http://schemas.microsoft.com/office/drawing/2010/main" xmlns="" w="9525">
                   <a:solidFill>
                     <a:srgbClr val="000000"/>
                   </a:solidFill>
@@ -4001,7 +4002,7 @@
             </a:ln>
             <a:extLst>
               <a:ext uri="{91240B29-F687-4f45-9708-019B960494DF}">
-                <a14:hiddenLine xmlns="" xmlns:a14="http://schemas.microsoft.com/office/drawing/2010/main" w="9525">
+                <a14:hiddenLine xmlns:a14="http://schemas.microsoft.com/office/drawing/2010/main" xmlns="" w="9525">
                   <a:solidFill>
                     <a:srgbClr val="000000"/>
                   </a:solidFill>
@@ -4121,7 +4122,7 @@
             </a:ln>
             <a:extLst>
               <a:ext uri="{91240B29-F687-4f45-9708-019B960494DF}">
-                <a14:hiddenLine xmlns="" xmlns:a14="http://schemas.microsoft.com/office/drawing/2010/main" w="9525">
+                <a14:hiddenLine xmlns:a14="http://schemas.microsoft.com/office/drawing/2010/main" xmlns="" w="9525">
                   <a:solidFill>
                     <a:srgbClr val="000000"/>
                   </a:solidFill>
@@ -4189,7 +4190,7 @@
             </a:ln>
             <a:extLst>
               <a:ext uri="{91240B29-F687-4f45-9708-019B960494DF}">
-                <a14:hiddenLine xmlns="" xmlns:a14="http://schemas.microsoft.com/office/drawing/2010/main" w="9525">
+                <a14:hiddenLine xmlns:a14="http://schemas.microsoft.com/office/drawing/2010/main" xmlns="" w="9525">
                   <a:solidFill>
                     <a:srgbClr val="000000"/>
                   </a:solidFill>
@@ -4279,7 +4280,7 @@
             </a:ln>
             <a:extLst>
               <a:ext uri="{91240B29-F687-4f45-9708-019B960494DF}">
-                <a14:hiddenLine xmlns="" xmlns:a14="http://schemas.microsoft.com/office/drawing/2010/main" w="9525">
+                <a14:hiddenLine xmlns:a14="http://schemas.microsoft.com/office/drawing/2010/main" xmlns="" w="9525">
                   <a:solidFill>
                     <a:srgbClr val="000000"/>
                   </a:solidFill>
@@ -4419,7 +4420,7 @@
           <a:p>
             <a:fld id="{F6717090-3DB0-4EC3-8B57-6FDE9E795EEA}" type="datetimeFigureOut">
               <a:rPr lang="es-CO" smtClean="0"/>
-              <a:t>10/12/2019</a:t>
+              <a:t>11/12/2019</a:t>
             </a:fld>
             <a:endParaRPr lang="es-CO" dirty="0"/>
           </a:p>
@@ -4686,7 +4687,7 @@
           <a:p>
             <a:fld id="{F6717090-3DB0-4EC3-8B57-6FDE9E795EEA}" type="datetimeFigureOut">
               <a:rPr lang="es-CO" smtClean="0"/>
-              <a:t>10/12/2019</a:t>
+              <a:t>11/12/2019</a:t>
             </a:fld>
             <a:endParaRPr lang="es-CO" dirty="0"/>
           </a:p>
@@ -4882,7 +4883,7 @@
           <a:p>
             <a:fld id="{F6717090-3DB0-4EC3-8B57-6FDE9E795EEA}" type="datetimeFigureOut">
               <a:rPr lang="es-CO" smtClean="0"/>
-              <a:t>10/12/2019</a:t>
+              <a:t>11/12/2019</a:t>
             </a:fld>
             <a:endParaRPr lang="es-CO" dirty="0"/>
           </a:p>
@@ -5145,7 +5146,7 @@
           <a:p>
             <a:fld id="{F6717090-3DB0-4EC3-8B57-6FDE9E795EEA}" type="datetimeFigureOut">
               <a:rPr lang="es-CO" smtClean="0"/>
-              <a:t>10/12/2019</a:t>
+              <a:t>11/12/2019</a:t>
             </a:fld>
             <a:endParaRPr lang="es-CO" dirty="0"/>
           </a:p>
@@ -5579,7 +5580,7 @@
           <a:p>
             <a:fld id="{F6717090-3DB0-4EC3-8B57-6FDE9E795EEA}" type="datetimeFigureOut">
               <a:rPr lang="es-CO" smtClean="0"/>
-              <a:t>10/12/2019</a:t>
+              <a:t>11/12/2019</a:t>
             </a:fld>
             <a:endParaRPr lang="es-CO" dirty="0"/>
           </a:p>
@@ -6125,7 +6126,7 @@
           <a:p>
             <a:fld id="{F6717090-3DB0-4EC3-8B57-6FDE9E795EEA}" type="datetimeFigureOut">
               <a:rPr lang="es-CO" smtClean="0"/>
-              <a:t>10/12/2019</a:t>
+              <a:t>11/12/2019</a:t>
             </a:fld>
             <a:endParaRPr lang="es-CO" dirty="0"/>
           </a:p>
@@ -6845,7 +6846,7 @@
           <a:p>
             <a:fld id="{F6717090-3DB0-4EC3-8B57-6FDE9E795EEA}" type="datetimeFigureOut">
               <a:rPr lang="es-CO" smtClean="0"/>
-              <a:t>10/12/2019</a:t>
+              <a:t>11/12/2019</a:t>
             </a:fld>
             <a:endParaRPr lang="es-CO" dirty="0"/>
           </a:p>
@@ -7015,7 +7016,7 @@
           <a:p>
             <a:fld id="{F6717090-3DB0-4EC3-8B57-6FDE9E795EEA}" type="datetimeFigureOut">
               <a:rPr lang="es-CO" smtClean="0"/>
-              <a:t>10/12/2019</a:t>
+              <a:t>11/12/2019</a:t>
             </a:fld>
             <a:endParaRPr lang="es-CO" dirty="0"/>
           </a:p>
@@ -7195,7 +7196,7 @@
           <a:p>
             <a:fld id="{F6717090-3DB0-4EC3-8B57-6FDE9E795EEA}" type="datetimeFigureOut">
               <a:rPr lang="es-CO" smtClean="0"/>
-              <a:t>10/12/2019</a:t>
+              <a:t>11/12/2019</a:t>
             </a:fld>
             <a:endParaRPr lang="es-CO" dirty="0"/>
           </a:p>
@@ -7365,7 +7366,7 @@
           <a:p>
             <a:fld id="{F6717090-3DB0-4EC3-8B57-6FDE9E795EEA}" type="datetimeFigureOut">
               <a:rPr lang="es-CO" smtClean="0"/>
-              <a:t>10/12/2019</a:t>
+              <a:t>11/12/2019</a:t>
             </a:fld>
             <a:endParaRPr lang="es-CO" dirty="0"/>
           </a:p>
@@ -7615,7 +7616,7 @@
           <a:p>
             <a:fld id="{F6717090-3DB0-4EC3-8B57-6FDE9E795EEA}" type="datetimeFigureOut">
               <a:rPr lang="es-CO" smtClean="0"/>
-              <a:t>10/12/2019</a:t>
+              <a:t>11/12/2019</a:t>
             </a:fld>
             <a:endParaRPr lang="es-CO" dirty="0"/>
           </a:p>
@@ -7847,7 +7848,7 @@
           <a:p>
             <a:fld id="{F6717090-3DB0-4EC3-8B57-6FDE9E795EEA}" type="datetimeFigureOut">
               <a:rPr lang="es-CO" smtClean="0"/>
-              <a:t>10/12/2019</a:t>
+              <a:t>11/12/2019</a:t>
             </a:fld>
             <a:endParaRPr lang="es-CO" dirty="0"/>
           </a:p>
@@ -8228,7 +8229,7 @@
           <a:p>
             <a:fld id="{F6717090-3DB0-4EC3-8B57-6FDE9E795EEA}" type="datetimeFigureOut">
               <a:rPr lang="es-CO" smtClean="0"/>
-              <a:t>10/12/2019</a:t>
+              <a:t>11/12/2019</a:t>
             </a:fld>
             <a:endParaRPr lang="es-CO" dirty="0"/>
           </a:p>
@@ -8346,7 +8347,7 @@
           <a:p>
             <a:fld id="{F6717090-3DB0-4EC3-8B57-6FDE9E795EEA}" type="datetimeFigureOut">
               <a:rPr lang="es-CO" smtClean="0"/>
-              <a:t>10/12/2019</a:t>
+              <a:t>11/12/2019</a:t>
             </a:fld>
             <a:endParaRPr lang="es-CO" dirty="0"/>
           </a:p>
@@ -8441,7 +8442,7 @@
           <a:p>
             <a:fld id="{F6717090-3DB0-4EC3-8B57-6FDE9E795EEA}" type="datetimeFigureOut">
               <a:rPr lang="es-CO" smtClean="0"/>
-              <a:t>10/12/2019</a:t>
+              <a:t>11/12/2019</a:t>
             </a:fld>
             <a:endParaRPr lang="es-CO" dirty="0"/>
           </a:p>
@@ -8690,7 +8691,7 @@
           <a:p>
             <a:fld id="{F6717090-3DB0-4EC3-8B57-6FDE9E795EEA}" type="datetimeFigureOut">
               <a:rPr lang="es-CO" smtClean="0"/>
-              <a:t>10/12/2019</a:t>
+              <a:t>11/12/2019</a:t>
             </a:fld>
             <a:endParaRPr lang="es-CO" dirty="0"/>
           </a:p>
@@ -8970,7 +8971,7 @@
           <a:p>
             <a:fld id="{F6717090-3DB0-4EC3-8B57-6FDE9E795EEA}" type="datetimeFigureOut">
               <a:rPr lang="es-CO" smtClean="0"/>
-              <a:t>10/12/2019</a:t>
+              <a:t>11/12/2019</a:t>
             </a:fld>
             <a:endParaRPr lang="es-CO" dirty="0"/>
           </a:p>
@@ -9093,7 +9094,7 @@
           <a:noFill/>
           <a:extLst>
             <a:ext uri="{909E8E84-426E-40dd-AFC4-6F175D3DCCD1}">
-              <a14:hiddenFill xmlns="" xmlns:a14="http://schemas.microsoft.com/office/drawing/2010/main">
+              <a14:hiddenFill xmlns:a14="http://schemas.microsoft.com/office/drawing/2010/main" xmlns="">
                 <a:solidFill>
                   <a:srgbClr val="FFFFFF"/>
                 </a:solidFill>
@@ -9167,7 +9168,7 @@
               </a:ln>
               <a:extLst>
                 <a:ext uri="{91240B29-F687-4f45-9708-019B960494DF}">
-                  <a14:hiddenLine xmlns="" xmlns:a14="http://schemas.microsoft.com/office/drawing/2010/main" w="9525">
+                  <a14:hiddenLine xmlns:a14="http://schemas.microsoft.com/office/drawing/2010/main" xmlns="" w="9525">
                     <a:solidFill>
                       <a:srgbClr val="000000"/>
                     </a:solidFill>
@@ -9257,7 +9258,7 @@
               </a:ln>
               <a:extLst>
                 <a:ext uri="{91240B29-F687-4f45-9708-019B960494DF}">
-                  <a14:hiddenLine xmlns="" xmlns:a14="http://schemas.microsoft.com/office/drawing/2010/main" w="9525">
+                  <a14:hiddenLine xmlns:a14="http://schemas.microsoft.com/office/drawing/2010/main" xmlns="" w="9525">
                     <a:solidFill>
                       <a:srgbClr val="000000"/>
                     </a:solidFill>
@@ -9347,7 +9348,7 @@
               </a:ln>
               <a:extLst>
                 <a:ext uri="{91240B29-F687-4f45-9708-019B960494DF}">
-                  <a14:hiddenLine xmlns="" xmlns:a14="http://schemas.microsoft.com/office/drawing/2010/main" w="9525">
+                  <a14:hiddenLine xmlns:a14="http://schemas.microsoft.com/office/drawing/2010/main" xmlns="" w="9525">
                     <a:solidFill>
                       <a:srgbClr val="000000"/>
                     </a:solidFill>
@@ -9409,7 +9410,7 @@
               </a:ln>
               <a:extLst>
                 <a:ext uri="{91240B29-F687-4f45-9708-019B960494DF}">
-                  <a14:hiddenLine xmlns="" xmlns:a14="http://schemas.microsoft.com/office/drawing/2010/main" w="9525">
+                  <a14:hiddenLine xmlns:a14="http://schemas.microsoft.com/office/drawing/2010/main" xmlns="" w="9525">
                     <a:solidFill>
                       <a:srgbClr val="000000"/>
                     </a:solidFill>
@@ -9499,7 +9500,7 @@
               </a:ln>
               <a:extLst>
                 <a:ext uri="{91240B29-F687-4f45-9708-019B960494DF}">
-                  <a14:hiddenLine xmlns="" xmlns:a14="http://schemas.microsoft.com/office/drawing/2010/main" w="9525">
+                  <a14:hiddenLine xmlns:a14="http://schemas.microsoft.com/office/drawing/2010/main" xmlns="" w="9525">
                     <a:solidFill>
                       <a:srgbClr val="000000"/>
                     </a:solidFill>
@@ -9561,7 +9562,7 @@
               </a:ln>
               <a:extLst>
                 <a:ext uri="{91240B29-F687-4f45-9708-019B960494DF}">
-                  <a14:hiddenLine xmlns="" xmlns:a14="http://schemas.microsoft.com/office/drawing/2010/main" w="9525">
+                  <a14:hiddenLine xmlns:a14="http://schemas.microsoft.com/office/drawing/2010/main" xmlns="" w="9525">
                     <a:solidFill>
                       <a:srgbClr val="000000"/>
                     </a:solidFill>
@@ -9623,7 +9624,7 @@
               </a:ln>
               <a:extLst>
                 <a:ext uri="{91240B29-F687-4f45-9708-019B960494DF}">
-                  <a14:hiddenLine xmlns="" xmlns:a14="http://schemas.microsoft.com/office/drawing/2010/main" w="9525">
+                  <a14:hiddenLine xmlns:a14="http://schemas.microsoft.com/office/drawing/2010/main" xmlns="" w="9525">
                     <a:solidFill>
                       <a:srgbClr val="000000"/>
                     </a:solidFill>
@@ -9713,7 +9714,7 @@
               </a:ln>
               <a:extLst>
                 <a:ext uri="{91240B29-F687-4f45-9708-019B960494DF}">
-                  <a14:hiddenLine xmlns="" xmlns:a14="http://schemas.microsoft.com/office/drawing/2010/main" w="9525">
+                  <a14:hiddenLine xmlns:a14="http://schemas.microsoft.com/office/drawing/2010/main" xmlns="" w="9525">
                     <a:solidFill>
                       <a:srgbClr val="000000"/>
                     </a:solidFill>
@@ -9803,7 +9804,7 @@
               </a:ln>
               <a:extLst>
                 <a:ext uri="{91240B29-F687-4f45-9708-019B960494DF}">
-                  <a14:hiddenLine xmlns="" xmlns:a14="http://schemas.microsoft.com/office/drawing/2010/main" w="9525">
+                  <a14:hiddenLine xmlns:a14="http://schemas.microsoft.com/office/drawing/2010/main" xmlns="" w="9525">
                     <a:solidFill>
                       <a:srgbClr val="000000"/>
                     </a:solidFill>
@@ -9865,7 +9866,7 @@
               </a:ln>
               <a:extLst>
                 <a:ext uri="{91240B29-F687-4f45-9708-019B960494DF}">
-                  <a14:hiddenLine xmlns="" xmlns:a14="http://schemas.microsoft.com/office/drawing/2010/main" w="9525">
+                  <a14:hiddenLine xmlns:a14="http://schemas.microsoft.com/office/drawing/2010/main" xmlns="" w="9525">
                     <a:solidFill>
                       <a:srgbClr val="000000"/>
                     </a:solidFill>
@@ -9975,7 +9976,7 @@
               </a:ln>
               <a:extLst>
                 <a:ext uri="{91240B29-F687-4f45-9708-019B960494DF}">
-                  <a14:hiddenLine xmlns="" xmlns:a14="http://schemas.microsoft.com/office/drawing/2010/main" w="9525">
+                  <a14:hiddenLine xmlns:a14="http://schemas.microsoft.com/office/drawing/2010/main" xmlns="" w="9525">
                     <a:solidFill>
                       <a:srgbClr val="000000"/>
                     </a:solidFill>
@@ -10059,7 +10060,7 @@
               </a:ln>
               <a:extLst>
                 <a:ext uri="{91240B29-F687-4f45-9708-019B960494DF}">
-                  <a14:hiddenLine xmlns="" xmlns:a14="http://schemas.microsoft.com/office/drawing/2010/main" w="9525">
+                  <a14:hiddenLine xmlns:a14="http://schemas.microsoft.com/office/drawing/2010/main" xmlns="" w="9525">
                     <a:solidFill>
                       <a:srgbClr val="000000"/>
                     </a:solidFill>
@@ -10121,7 +10122,7 @@
               </a:ln>
               <a:extLst>
                 <a:ext uri="{91240B29-F687-4f45-9708-019B960494DF}">
-                  <a14:hiddenLine xmlns="" xmlns:a14="http://schemas.microsoft.com/office/drawing/2010/main" w="9525">
+                  <a14:hiddenLine xmlns:a14="http://schemas.microsoft.com/office/drawing/2010/main" xmlns="" w="9525">
                     <a:solidFill>
                       <a:srgbClr val="000000"/>
                     </a:solidFill>
@@ -10183,7 +10184,7 @@
               </a:ln>
               <a:extLst>
                 <a:ext uri="{91240B29-F687-4f45-9708-019B960494DF}">
-                  <a14:hiddenLine xmlns="" xmlns:a14="http://schemas.microsoft.com/office/drawing/2010/main" w="9525">
+                  <a14:hiddenLine xmlns:a14="http://schemas.microsoft.com/office/drawing/2010/main" xmlns="" w="9525">
                     <a:solidFill>
                       <a:srgbClr val="000000"/>
                     </a:solidFill>
@@ -10273,7 +10274,7 @@
               </a:ln>
               <a:extLst>
                 <a:ext uri="{91240B29-F687-4f45-9708-019B960494DF}">
-                  <a14:hiddenLine xmlns="" xmlns:a14="http://schemas.microsoft.com/office/drawing/2010/main" w="9525">
+                  <a14:hiddenLine xmlns:a14="http://schemas.microsoft.com/office/drawing/2010/main" xmlns="" w="9525">
                     <a:solidFill>
                       <a:srgbClr val="000000"/>
                     </a:solidFill>
@@ -10307,7 +10308,7 @@
               </a:ln>
               <a:extLst>
                 <a:ext uri="{91240B29-F687-4f45-9708-019B960494DF}">
-                  <a14:hiddenLine xmlns="" xmlns:a14="http://schemas.microsoft.com/office/drawing/2010/main" w="9525">
+                  <a14:hiddenLine xmlns:a14="http://schemas.microsoft.com/office/drawing/2010/main" xmlns="" w="9525">
                     <a:solidFill>
                       <a:srgbClr val="000000"/>
                     </a:solidFill>
@@ -10372,7 +10373,7 @@
               </a:ln>
               <a:extLst>
                 <a:ext uri="{91240B29-F687-4f45-9708-019B960494DF}">
-                  <a14:hiddenLine xmlns="" xmlns:a14="http://schemas.microsoft.com/office/drawing/2010/main" w="9525">
+                  <a14:hiddenLine xmlns:a14="http://schemas.microsoft.com/office/drawing/2010/main" xmlns="" w="9525">
                     <a:solidFill>
                       <a:srgbClr val="000000"/>
                     </a:solidFill>
@@ -10462,7 +10463,7 @@
               </a:ln>
               <a:extLst>
                 <a:ext uri="{91240B29-F687-4f45-9708-019B960494DF}">
-                  <a14:hiddenLine xmlns="" xmlns:a14="http://schemas.microsoft.com/office/drawing/2010/main" w="9525">
+                  <a14:hiddenLine xmlns:a14="http://schemas.microsoft.com/office/drawing/2010/main" xmlns="" w="9525">
                     <a:solidFill>
                       <a:srgbClr val="000000"/>
                     </a:solidFill>
@@ -10524,7 +10525,7 @@
               </a:ln>
               <a:extLst>
                 <a:ext uri="{91240B29-F687-4f45-9708-019B960494DF}">
-                  <a14:hiddenLine xmlns="" xmlns:a14="http://schemas.microsoft.com/office/drawing/2010/main" w="9525">
+                  <a14:hiddenLine xmlns:a14="http://schemas.microsoft.com/office/drawing/2010/main" xmlns="" w="9525">
                     <a:solidFill>
                       <a:srgbClr val="000000"/>
                     </a:solidFill>
@@ -10614,7 +10615,7 @@
               </a:ln>
               <a:extLst>
                 <a:ext uri="{91240B29-F687-4f45-9708-019B960494DF}">
-                  <a14:hiddenLine xmlns="" xmlns:a14="http://schemas.microsoft.com/office/drawing/2010/main" w="9525">
+                  <a14:hiddenLine xmlns:a14="http://schemas.microsoft.com/office/drawing/2010/main" xmlns="" w="9525">
                     <a:solidFill>
                       <a:srgbClr val="000000"/>
                     </a:solidFill>
@@ -10679,7 +10680,7 @@
               </a:ln>
               <a:extLst>
                 <a:ext uri="{91240B29-F687-4f45-9708-019B960494DF}">
-                  <a14:hiddenLine xmlns="" xmlns:a14="http://schemas.microsoft.com/office/drawing/2010/main" w="9525">
+                  <a14:hiddenLine xmlns:a14="http://schemas.microsoft.com/office/drawing/2010/main" xmlns="" w="9525">
                     <a:solidFill>
                       <a:srgbClr val="000000"/>
                     </a:solidFill>
@@ -10741,7 +10742,7 @@
               </a:ln>
               <a:extLst>
                 <a:ext uri="{91240B29-F687-4f45-9708-019B960494DF}">
-                  <a14:hiddenLine xmlns="" xmlns:a14="http://schemas.microsoft.com/office/drawing/2010/main" w="9525">
+                  <a14:hiddenLine xmlns:a14="http://schemas.microsoft.com/office/drawing/2010/main" xmlns="" w="9525">
                     <a:solidFill>
                       <a:srgbClr val="000000"/>
                     </a:solidFill>
@@ -10831,7 +10832,7 @@
               </a:ln>
               <a:extLst>
                 <a:ext uri="{91240B29-F687-4f45-9708-019B960494DF}">
-                  <a14:hiddenLine xmlns="" xmlns:a14="http://schemas.microsoft.com/office/drawing/2010/main" w="9525">
+                  <a14:hiddenLine xmlns:a14="http://schemas.microsoft.com/office/drawing/2010/main" xmlns="" w="9525">
                     <a:solidFill>
                       <a:srgbClr val="000000"/>
                     </a:solidFill>
@@ -10921,7 +10922,7 @@
               </a:ln>
               <a:extLst>
                 <a:ext uri="{91240B29-F687-4f45-9708-019B960494DF}">
-                  <a14:hiddenLine xmlns="" xmlns:a14="http://schemas.microsoft.com/office/drawing/2010/main" w="9525">
+                  <a14:hiddenLine xmlns:a14="http://schemas.microsoft.com/office/drawing/2010/main" xmlns="" w="9525">
                     <a:solidFill>
                       <a:srgbClr val="000000"/>
                     </a:solidFill>
@@ -10986,7 +10987,7 @@
               </a:ln>
               <a:extLst>
                 <a:ext uri="{91240B29-F687-4f45-9708-019B960494DF}">
-                  <a14:hiddenLine xmlns="" xmlns:a14="http://schemas.microsoft.com/office/drawing/2010/main" w="9525">
+                  <a14:hiddenLine xmlns:a14="http://schemas.microsoft.com/office/drawing/2010/main" xmlns="" w="9525">
                     <a:solidFill>
                       <a:srgbClr val="000000"/>
                     </a:solidFill>
@@ -11106,7 +11107,7 @@
               </a:ln>
               <a:extLst>
                 <a:ext uri="{91240B29-F687-4f45-9708-019B960494DF}">
-                  <a14:hiddenLine xmlns="" xmlns:a14="http://schemas.microsoft.com/office/drawing/2010/main" w="9525">
+                  <a14:hiddenLine xmlns:a14="http://schemas.microsoft.com/office/drawing/2010/main" xmlns="" w="9525">
                     <a:solidFill>
                       <a:srgbClr val="000000"/>
                     </a:solidFill>
@@ -11187,7 +11188,7 @@
               </a:ln>
               <a:extLst>
                 <a:ext uri="{91240B29-F687-4f45-9708-019B960494DF}">
-                  <a14:hiddenLine xmlns="" xmlns:a14="http://schemas.microsoft.com/office/drawing/2010/main" w="9525">
+                  <a14:hiddenLine xmlns:a14="http://schemas.microsoft.com/office/drawing/2010/main" xmlns="" w="9525">
                     <a:solidFill>
                       <a:srgbClr val="000000"/>
                     </a:solidFill>
@@ -11302,7 +11303,7 @@
               </a:ln>
               <a:extLst>
                 <a:ext uri="{91240B29-F687-4f45-9708-019B960494DF}">
-                  <a14:hiddenLine xmlns="" xmlns:a14="http://schemas.microsoft.com/office/drawing/2010/main" w="9525">
+                  <a14:hiddenLine xmlns:a14="http://schemas.microsoft.com/office/drawing/2010/main" xmlns="" w="9525">
                     <a:solidFill>
                       <a:srgbClr val="000000"/>
                     </a:solidFill>
@@ -11392,7 +11393,7 @@
               </a:ln>
               <a:extLst>
                 <a:ext uri="{91240B29-F687-4f45-9708-019B960494DF}">
-                  <a14:hiddenLine xmlns="" xmlns:a14="http://schemas.microsoft.com/office/drawing/2010/main" w="9525">
+                  <a14:hiddenLine xmlns:a14="http://schemas.microsoft.com/office/drawing/2010/main" xmlns="" w="9525">
                     <a:solidFill>
                       <a:srgbClr val="000000"/>
                     </a:solidFill>
@@ -11457,7 +11458,7 @@
               </a:ln>
               <a:extLst>
                 <a:ext uri="{91240B29-F687-4f45-9708-019B960494DF}">
-                  <a14:hiddenLine xmlns="" xmlns:a14="http://schemas.microsoft.com/office/drawing/2010/main" w="9525">
+                  <a14:hiddenLine xmlns:a14="http://schemas.microsoft.com/office/drawing/2010/main" xmlns="" w="9525">
                     <a:solidFill>
                       <a:srgbClr val="000000"/>
                     </a:solidFill>
@@ -11547,7 +11548,7 @@
               </a:ln>
               <a:extLst>
                 <a:ext uri="{91240B29-F687-4f45-9708-019B960494DF}">
-                  <a14:hiddenLine xmlns="" xmlns:a14="http://schemas.microsoft.com/office/drawing/2010/main" w="9525">
+                  <a14:hiddenLine xmlns:a14="http://schemas.microsoft.com/office/drawing/2010/main" xmlns="" w="9525">
                     <a:solidFill>
                       <a:srgbClr val="000000"/>
                     </a:solidFill>
@@ -11615,7 +11616,7 @@
               </a:ln>
               <a:extLst>
                 <a:ext uri="{91240B29-F687-4f45-9708-019B960494DF}">
-                  <a14:hiddenLine xmlns="" xmlns:a14="http://schemas.microsoft.com/office/drawing/2010/main" w="9525">
+                  <a14:hiddenLine xmlns:a14="http://schemas.microsoft.com/office/drawing/2010/main" xmlns="" w="9525">
                     <a:solidFill>
                       <a:srgbClr val="000000"/>
                     </a:solidFill>
@@ -11705,7 +11706,7 @@
               </a:ln>
               <a:extLst>
                 <a:ext uri="{91240B29-F687-4f45-9708-019B960494DF}">
-                  <a14:hiddenLine xmlns="" xmlns:a14="http://schemas.microsoft.com/office/drawing/2010/main" w="9525">
+                  <a14:hiddenLine xmlns:a14="http://schemas.microsoft.com/office/drawing/2010/main" xmlns="" w="9525">
                     <a:solidFill>
                       <a:srgbClr val="000000"/>
                     </a:solidFill>
@@ -11773,7 +11774,7 @@
               </a:ln>
               <a:extLst>
                 <a:ext uri="{91240B29-F687-4f45-9708-019B960494DF}">
-                  <a14:hiddenLine xmlns="" xmlns:a14="http://schemas.microsoft.com/office/drawing/2010/main" w="9525">
+                  <a14:hiddenLine xmlns:a14="http://schemas.microsoft.com/office/drawing/2010/main" xmlns="" w="9525">
                     <a:solidFill>
                       <a:srgbClr val="000000"/>
                     </a:solidFill>
@@ -11863,7 +11864,7 @@
               </a:ln>
               <a:extLst>
                 <a:ext uri="{91240B29-F687-4f45-9708-019B960494DF}">
-                  <a14:hiddenLine xmlns="" xmlns:a14="http://schemas.microsoft.com/office/drawing/2010/main" w="9525">
+                  <a14:hiddenLine xmlns:a14="http://schemas.microsoft.com/office/drawing/2010/main" xmlns="" w="9525">
                     <a:solidFill>
                       <a:srgbClr val="000000"/>
                     </a:solidFill>
@@ -11897,7 +11898,7 @@
               </a:ln>
               <a:extLst>
                 <a:ext uri="{91240B29-F687-4f45-9708-019B960494DF}">
-                  <a14:hiddenLine xmlns="" xmlns:a14="http://schemas.microsoft.com/office/drawing/2010/main" w="9525">
+                  <a14:hiddenLine xmlns:a14="http://schemas.microsoft.com/office/drawing/2010/main" xmlns="" w="9525">
                     <a:solidFill>
                       <a:srgbClr val="000000"/>
                     </a:solidFill>
@@ -12037,7 +12038,7 @@
           <a:p>
             <a:fld id="{F6717090-3DB0-4EC3-8B57-6FDE9E795EEA}" type="datetimeFigureOut">
               <a:rPr lang="es-CO" smtClean="0"/>
-              <a:t>10/12/2019</a:t>
+              <a:t>11/12/2019</a:t>
             </a:fld>
             <a:endParaRPr lang="es-CO" dirty="0"/>
           </a:p>
@@ -13528,95 +13529,6 @@
           <a:chExt cx="0" cy="0"/>
         </a:xfrm>
       </p:grpSpPr>
-      <p:sp>
-        <p:nvSpPr>
-          <p:cNvPr id="4" name="Título 3">
-            <a:extLst>
-              <a:ext uri="{FF2B5EF4-FFF2-40B4-BE49-F238E27FC236}">
-                <a16:creationId xmlns:a16="http://schemas.microsoft.com/office/drawing/2014/main" id="{AC2194CF-E1B3-4E62-92A2-680F7E1B4836}"/>
-              </a:ext>
-            </a:extLst>
-          </p:cNvPr>
-          <p:cNvSpPr>
-            <a:spLocks noGrp="1"/>
-          </p:cNvSpPr>
-          <p:nvPr>
-            <p:ph type="title"/>
-          </p:nvPr>
-        </p:nvSpPr>
-        <p:spPr/>
-        <p:txBody>
-          <a:bodyPr/>
-          <a:lstStyle/>
-          <a:p>
-            <a:r>
-              <a:rPr lang="es-CO" b="1" dirty="0">
-                <a:latin typeface="Century Gothic" panose="020B0502020202020204" pitchFamily="34" charset="0"/>
-              </a:rPr>
-              <a:t>Alcance</a:t>
-            </a:r>
-          </a:p>
-        </p:txBody>
-      </p:sp>
-      <p:sp>
-        <p:nvSpPr>
-          <p:cNvPr id="3" name="Marcador de contenido 2"/>
-          <p:cNvSpPr>
-            <a:spLocks noGrp="1"/>
-          </p:cNvSpPr>
-          <p:nvPr>
-            <p:ph idx="1"/>
-          </p:nvPr>
-        </p:nvSpPr>
-        <p:spPr/>
-        <p:txBody>
-          <a:bodyPr>
-            <a:normAutofit/>
-          </a:bodyPr>
-          <a:lstStyle/>
-          <a:p>
-            <a:pPr marL="0" indent="0">
-              <a:buNone/>
-            </a:pPr>
-            <a:r>
-              <a:rPr lang="es-CO" sz="2800" dirty="0">
-                <a:latin typeface="Century Gothic" panose="020B0502020202020204" pitchFamily="34" charset="0"/>
-              </a:rPr>
-              <a:t>Mejorar la seguridad en vehículos a través  de un sistema de encendido biométrico del automotor, el cual este apoyado por un software en el que se podrá realizar monitoreo vía GPS para localizar los vehículos registrados.</a:t>
-            </a:r>
-          </a:p>
-        </p:txBody>
-      </p:sp>
-    </p:spTree>
-    <p:extLst>
-      <p:ext uri="{BB962C8B-B14F-4D97-AF65-F5344CB8AC3E}">
-        <p14:creationId xmlns:p14="http://schemas.microsoft.com/office/powerpoint/2010/main" val="1661043369"/>
-      </p:ext>
-    </p:extLst>
-  </p:cSld>
-  <p:clrMapOvr>
-    <a:masterClrMapping/>
-  </p:clrMapOvr>
-</p:sld>
-</file>
-
-<file path=ppt/slides/slide18.xml><?xml version="1.0" encoding="utf-8"?>
-<p:sld xmlns:a="http://schemas.openxmlformats.org/drawingml/2006/main" xmlns:r="http://schemas.openxmlformats.org/officeDocument/2006/relationships" xmlns:p="http://schemas.openxmlformats.org/presentationml/2006/main">
-  <p:cSld>
-    <p:spTree>
-      <p:nvGrpSpPr>
-        <p:cNvPr id="1" name=""/>
-        <p:cNvGrpSpPr/>
-        <p:nvPr/>
-      </p:nvGrpSpPr>
-      <p:grpSpPr>
-        <a:xfrm>
-          <a:off x="0" y="0"/>
-          <a:ext cx="0" cy="0"/>
-          <a:chOff x="0" y="0"/>
-          <a:chExt cx="0" cy="0"/>
-        </a:xfrm>
-      </p:grpSpPr>
       <p:pic>
         <p:nvPicPr>
           <p:cNvPr id="2" name="Imagen 1">
@@ -13711,6 +13623,89 @@
 </p:sld>
 </file>
 
+<file path=ppt/slides/slide18.xml><?xml version="1.0" encoding="utf-8"?>
+<p:sld xmlns:a="http://schemas.openxmlformats.org/drawingml/2006/main" xmlns:r="http://schemas.openxmlformats.org/officeDocument/2006/relationships" xmlns:p="http://schemas.openxmlformats.org/presentationml/2006/main">
+  <p:cSld>
+    <p:spTree>
+      <p:nvGrpSpPr>
+        <p:cNvPr id="1" name=""/>
+        <p:cNvGrpSpPr/>
+        <p:nvPr/>
+      </p:nvGrpSpPr>
+      <p:grpSpPr>
+        <a:xfrm>
+          <a:off x="0" y="0"/>
+          <a:ext cx="0" cy="0"/>
+          <a:chOff x="0" y="0"/>
+          <a:chExt cx="0" cy="0"/>
+        </a:xfrm>
+      </p:grpSpPr>
+      <p:sp>
+        <p:nvSpPr>
+          <p:cNvPr id="2" name="Título 1"/>
+          <p:cNvSpPr>
+            <a:spLocks noGrp="1"/>
+          </p:cNvSpPr>
+          <p:nvPr>
+            <p:ph type="title"/>
+          </p:nvPr>
+        </p:nvSpPr>
+        <p:spPr>
+          <a:xfrm>
+            <a:off x="1258979" y="96004"/>
+            <a:ext cx="9905998" cy="1478570"/>
+          </a:xfrm>
+        </p:spPr>
+        <p:txBody>
+          <a:bodyPr/>
+          <a:lstStyle/>
+          <a:p>
+            <a:r>
+              <a:rPr lang="es-CO" dirty="0" smtClean="0"/>
+              <a:t>GITHUB</a:t>
+            </a:r>
+            <a:endParaRPr lang="en-US" dirty="0"/>
+          </a:p>
+        </p:txBody>
+      </p:sp>
+      <p:pic>
+        <p:nvPicPr>
+          <p:cNvPr id="3" name="Imagen 2">
+            <a:hlinkClick r:id="rId2"/>
+          </p:cNvPr>
+          <p:cNvPicPr>
+            <a:picLocks noChangeAspect="1"/>
+          </p:cNvPicPr>
+          <p:nvPr/>
+        </p:nvPicPr>
+        <p:blipFill rotWithShape="1">
+          <a:blip r:embed="rId3"/>
+          <a:srcRect r="15286"/>
+          <a:stretch/>
+        </p:blipFill>
+        <p:spPr>
+          <a:xfrm>
+            <a:off x="2172146" y="1214112"/>
+            <a:ext cx="8079664" cy="5362303"/>
+          </a:xfrm>
+          <a:prstGeom prst="rect">
+            <a:avLst/>
+          </a:prstGeom>
+        </p:spPr>
+      </p:pic>
+    </p:spTree>
+    <p:extLst>
+      <p:ext uri="{BB962C8B-B14F-4D97-AF65-F5344CB8AC3E}">
+        <p14:creationId xmlns:p14="http://schemas.microsoft.com/office/powerpoint/2010/main" val="3194111844"/>
+      </p:ext>
+    </p:extLst>
+  </p:cSld>
+  <p:clrMapOvr>
+    <a:masterClrMapping/>
+  </p:clrMapOvr>
+</p:sld>
+</file>
+
 <file path=ppt/slides/slide19.xml><?xml version="1.0" encoding="utf-8"?>
 <p:sld xmlns:a="http://schemas.openxmlformats.org/drawingml/2006/main" xmlns:r="http://schemas.openxmlformats.org/officeDocument/2006/relationships" xmlns:p="http://schemas.openxmlformats.org/presentationml/2006/main">
   <p:cSld>
@@ -13746,19 +13741,21 @@
         </p:nvSpPr>
         <p:spPr>
           <a:xfrm>
-            <a:off x="443754" y="509226"/>
-            <a:ext cx="4999615" cy="760176"/>
+            <a:off x="141454" y="2586221"/>
+            <a:ext cx="5606201" cy="760176"/>
           </a:xfrm>
         </p:spPr>
         <p:txBody>
-          <a:bodyPr/>
+          <a:bodyPr>
+            <a:noAutofit/>
+          </a:bodyPr>
           <a:lstStyle/>
           <a:p>
             <a:r>
-              <a:rPr lang="es-MX" b="1" dirty="0"/>
+              <a:rPr lang="es-MX" sz="4000" b="1" dirty="0"/>
               <a:t>HISTORIAS DE USUARIO</a:t>
             </a:r>
-            <a:endParaRPr lang="es-CO" b="1" dirty="0"/>
+            <a:endParaRPr lang="es-CO" sz="4000" b="1" dirty="0"/>
           </a:p>
         </p:txBody>
       </p:sp>
@@ -13777,20 +13774,20 @@
           <p:nvPr>
             <p:extLst>
               <p:ext uri="{D42A27DB-BD31-4B8C-83A1-F6EECF244321}">
-                <p14:modId xmlns:p14="http://schemas.microsoft.com/office/powerpoint/2010/main" val="4067405290"/>
+                <p14:modId xmlns:p14="http://schemas.microsoft.com/office/powerpoint/2010/main" val="670573772"/>
               </p:ext>
             </p:extLst>
           </p:nvPr>
         </p:nvGraphicFramePr>
         <p:xfrm>
-          <a:off x="1429169" y="2350769"/>
+          <a:off x="1442232" y="3578677"/>
           <a:ext cx="2607070" cy="2199715"/>
         </p:xfrm>
         <a:graphic>
           <a:graphicData uri="http://schemas.openxmlformats.org/presentationml/2006/ole">
             <mc:AlternateContent xmlns:mc="http://schemas.openxmlformats.org/markup-compatibility/2006">
               <mc:Choice xmlns:v="urn:schemas-microsoft-com:vml" Requires="v">
-                <p:oleObj spid="_x0000_s1034" name="Worksheet" showAsIcon="1" r:id="rId3" imgW="914271" imgH="771595" progId="Excel.Sheet.12">
+                <p:oleObj spid="_x0000_s1053" name="Worksheet" showAsIcon="1" r:id="rId3" imgW="914271" imgH="771595" progId="Excel.Sheet.12">
                   <p:embed/>
                 </p:oleObj>
               </mc:Choice>
@@ -13811,7 +13808,7 @@
                     </p:blipFill>
                     <p:spPr>
                       <a:xfrm>
-                        <a:off x="1429169" y="2350769"/>
+                        <a:off x="1442232" y="3578677"/>
                         <a:ext cx="2607070" cy="2199715"/>
                       </a:xfrm>
                       <a:prstGeom prst="rect">
@@ -13889,23 +13886,21 @@
             <p:ph type="title"/>
           </p:nvPr>
         </p:nvSpPr>
-        <p:spPr/>
+        <p:spPr>
+          <a:xfrm>
+            <a:off x="1141413" y="0"/>
+            <a:ext cx="9905998" cy="1478570"/>
+          </a:xfrm>
+        </p:spPr>
         <p:txBody>
-          <a:bodyPr>
-            <a:normAutofit/>
-          </a:bodyPr>
+          <a:bodyPr/>
           <a:lstStyle/>
           <a:p>
             <a:r>
-              <a:rPr lang="es-CO" b="1" dirty="0">
-                <a:effectLst/>
-                <a:latin typeface="Century Gothic" panose="020B0502020202020204" pitchFamily="34" charset="0"/>
-              </a:rPr>
-              <a:t>OBJETIVO GENERAL</a:t>
+              <a:rPr lang="es-CO" b="1" dirty="0" smtClean="0"/>
+              <a:t>ÍNDICE</a:t>
             </a:r>
-            <a:endParaRPr lang="es-CO" b="1" dirty="0">
-              <a:latin typeface="Century Gothic" panose="020B0502020202020204" pitchFamily="34" charset="0"/>
-            </a:endParaRPr>
+            <a:endParaRPr lang="en-US" b="1" dirty="0"/>
           </a:p>
         </p:txBody>
       </p:sp>
@@ -13919,35 +13914,199 @@
             <p:ph idx="1"/>
           </p:nvPr>
         </p:nvSpPr>
-        <p:spPr/>
+        <p:spPr>
+          <a:xfrm>
+            <a:off x="1141412" y="1152207"/>
+            <a:ext cx="9905999" cy="5196342"/>
+          </a:xfrm>
+        </p:spPr>
         <p:txBody>
-          <a:bodyPr>
-            <a:normAutofit/>
+          <a:bodyPr numCol="2">
+            <a:noAutofit/>
           </a:bodyPr>
           <a:lstStyle/>
           <a:p>
-            <a:pPr marL="0" indent="0">
-              <a:buNone/>
+            <a:pPr marL="457200" indent="-457200">
+              <a:buFont typeface="+mj-lt"/>
+              <a:buAutoNum type="arabicPeriod"/>
             </a:pPr>
             <a:r>
-              <a:rPr lang="es-CO" sz="2800" dirty="0">
-                <a:effectLst/>
-                <a:latin typeface="Century Gothic" panose="020B0502020202020204" pitchFamily="34" charset="0"/>
-              </a:rPr>
-              <a:t>Desarrollar un software de encendido biométrico para vehículos por medio de una huella dactilar brindando de esa manera una mayor seguridad para el usuario</a:t>
+              <a:rPr lang="es-ES" dirty="0" smtClean="0"/>
+              <a:t>Objetivo general</a:t>
             </a:r>
           </a:p>
           <a:p>
-            <a:endParaRPr lang="es-CO" sz="3200" dirty="0">
-              <a:latin typeface="Century Gothic" panose="020B0502020202020204" pitchFamily="34" charset="0"/>
-            </a:endParaRPr>
+            <a:pPr marL="457200" indent="-457200">
+              <a:buFont typeface="+mj-lt"/>
+              <a:buAutoNum type="arabicPeriod"/>
+            </a:pPr>
+            <a:r>
+              <a:rPr lang="es-ES" dirty="0" smtClean="0"/>
+              <a:t>Objetivos específicos</a:t>
+            </a:r>
+          </a:p>
+          <a:p>
+            <a:pPr marL="457200" indent="-457200">
+              <a:buFont typeface="+mj-lt"/>
+              <a:buAutoNum type="arabicPeriod"/>
+            </a:pPr>
+            <a:r>
+              <a:rPr lang="es-ES" dirty="0" smtClean="0"/>
+              <a:t>Planteamiento del problema</a:t>
+            </a:r>
+          </a:p>
+          <a:p>
+            <a:pPr marL="457200" indent="-457200">
+              <a:buFont typeface="+mj-lt"/>
+              <a:buAutoNum type="arabicPeriod"/>
+            </a:pPr>
+            <a:r>
+              <a:rPr lang="es-ES" dirty="0" smtClean="0"/>
+              <a:t>Innovación</a:t>
+            </a:r>
+          </a:p>
+          <a:p>
+            <a:pPr marL="457200" indent="-457200">
+              <a:buFont typeface="+mj-lt"/>
+              <a:buAutoNum type="arabicPeriod"/>
+            </a:pPr>
+            <a:r>
+              <a:rPr lang="es-ES" dirty="0" smtClean="0"/>
+              <a:t>Justificación</a:t>
+            </a:r>
+          </a:p>
+          <a:p>
+            <a:pPr marL="457200" indent="-457200">
+              <a:buFont typeface="+mj-lt"/>
+              <a:buAutoNum type="arabicPeriod"/>
+            </a:pPr>
+            <a:r>
+              <a:rPr lang="es-ES" dirty="0" smtClean="0"/>
+              <a:t>Alcance</a:t>
+            </a:r>
+          </a:p>
+          <a:p>
+            <a:pPr marL="457200" indent="-457200">
+              <a:buFont typeface="+mj-lt"/>
+              <a:buAutoNum type="arabicPeriod"/>
+            </a:pPr>
+            <a:r>
+              <a:rPr lang="es-ES" dirty="0" smtClean="0"/>
+              <a:t>Técnicas de recolección de información</a:t>
+            </a:r>
+          </a:p>
+          <a:p>
+            <a:pPr marL="457200" indent="-457200">
+              <a:buFont typeface="+mj-lt"/>
+              <a:buAutoNum type="arabicPeriod"/>
+            </a:pPr>
+            <a:r>
+              <a:rPr lang="en-US" dirty="0" smtClean="0"/>
+              <a:t>Business Process Model and Notation (</a:t>
+            </a:r>
+            <a:r>
+              <a:rPr lang="en-US" dirty="0" err="1" smtClean="0"/>
+              <a:t>BPMN</a:t>
+            </a:r>
+            <a:r>
+              <a:rPr lang="en-US" dirty="0" smtClean="0"/>
+              <a:t>)</a:t>
+            </a:r>
+          </a:p>
+          <a:p>
+            <a:pPr marL="457200" indent="-457200">
+              <a:buFont typeface="+mj-lt"/>
+              <a:buAutoNum type="arabicPeriod"/>
+            </a:pPr>
+            <a:r>
+              <a:rPr lang="es-CO" dirty="0" smtClean="0"/>
+              <a:t>GitHub</a:t>
+            </a:r>
+          </a:p>
+          <a:p>
+            <a:pPr marL="457200" indent="-457200">
+              <a:buFont typeface="+mj-lt"/>
+              <a:buAutoNum type="arabicPeriod"/>
+            </a:pPr>
+            <a:r>
+              <a:rPr lang="es-CO" dirty="0" smtClean="0"/>
+              <a:t> Historias de usuario</a:t>
+            </a:r>
+          </a:p>
+          <a:p>
+            <a:pPr marL="457200" indent="-457200">
+              <a:buFont typeface="+mj-lt"/>
+              <a:buAutoNum type="arabicPeriod"/>
+            </a:pPr>
+            <a:r>
+              <a:rPr lang="es-CO" dirty="0" smtClean="0"/>
+              <a:t>Casos de uso</a:t>
+            </a:r>
+          </a:p>
+          <a:p>
+            <a:pPr marL="457200" indent="-457200">
+              <a:buFont typeface="+mj-lt"/>
+              <a:buAutoNum type="arabicPeriod"/>
+            </a:pPr>
+            <a:r>
+              <a:rPr lang="es-CO" dirty="0" smtClean="0"/>
+              <a:t> Casos de uso extendido</a:t>
+            </a:r>
+          </a:p>
+          <a:p>
+            <a:pPr marL="457200" indent="-457200">
+              <a:buFont typeface="+mj-lt"/>
+              <a:buAutoNum type="arabicPeriod"/>
+            </a:pPr>
+            <a:r>
+              <a:rPr lang="es-CO" dirty="0" smtClean="0"/>
+              <a:t> Modelo entidad relación </a:t>
+            </a:r>
+          </a:p>
+          <a:p>
+            <a:pPr marL="457200" indent="-457200">
+              <a:buFont typeface="+mj-lt"/>
+              <a:buAutoNum type="arabicPeriod"/>
+            </a:pPr>
+            <a:r>
+              <a:rPr lang="es-CO" dirty="0"/>
+              <a:t> D</a:t>
+            </a:r>
+            <a:r>
+              <a:rPr lang="es-CO" dirty="0" smtClean="0"/>
+              <a:t>iagrama de gantt, presupuesto y selección de personal</a:t>
+            </a:r>
+          </a:p>
+          <a:p>
+            <a:pPr marL="457200" indent="-457200">
+              <a:buFont typeface="+mj-lt"/>
+              <a:buAutoNum type="arabicPeriod"/>
+            </a:pPr>
+            <a:r>
+              <a:rPr lang="es-CO" dirty="0" smtClean="0"/>
+              <a:t> Bibliografía</a:t>
+            </a:r>
+          </a:p>
+          <a:p>
+            <a:pPr marL="457200" indent="-457200">
+              <a:buFont typeface="+mj-lt"/>
+              <a:buAutoNum type="arabicPeriod"/>
+            </a:pPr>
+            <a:endParaRPr lang="es-CO" dirty="0" smtClean="0"/>
+          </a:p>
+          <a:p>
+            <a:pPr marL="457200" indent="-457200">
+              <a:buFont typeface="+mj-lt"/>
+              <a:buAutoNum type="arabicPeriod"/>
+            </a:pPr>
+            <a:endParaRPr lang="es-ES" dirty="0"/>
           </a:p>
         </p:txBody>
       </p:sp>
     </p:spTree>
     <p:extLst>
       <p:ext uri="{BB962C8B-B14F-4D97-AF65-F5344CB8AC3E}">
-        <p14:creationId xmlns:p14="http://schemas.microsoft.com/office/powerpoint/2010/main" val="2729265752"/>
+        <p14:creationId xmlns:p14="http://schemas.microsoft.com/office/powerpoint/2010/main" val="2290823574"/>
       </p:ext>
     </p:extLst>
   </p:cSld>
@@ -14661,13 +14820,17 @@
         </p:spPr>
         <p:txBody>
           <a:bodyPr>
-            <a:normAutofit fontScale="90000"/>
+            <a:normAutofit/>
           </a:bodyPr>
           <a:lstStyle/>
           <a:p>
             <a:r>
+              <a:rPr lang="es-MX" b="1" dirty="0"/>
+              <a:t>Modelo entidad </a:t>
+            </a:r>
+            <a:r>
               <a:rPr lang="es-MX" b="1" dirty="0" smtClean="0"/>
-              <a:t>MODELO DE BASE DE DATOS RELACIONAL</a:t>
+              <a:t>relación</a:t>
             </a:r>
             <a:endParaRPr lang="es-CO" b="1" dirty="0"/>
           </a:p>
@@ -14769,6 +14932,109 @@
           </a:p>
         </p:txBody>
       </p:sp>
+      <p:graphicFrame>
+        <p:nvGraphicFramePr>
+          <p:cNvPr id="2" name="Objeto 1"/>
+          <p:cNvGraphicFramePr>
+            <a:graphicFrameLocks noChangeAspect="1"/>
+          </p:cNvGraphicFramePr>
+          <p:nvPr>
+            <p:extLst>
+              <p:ext uri="{D42A27DB-BD31-4B8C-83A1-F6EECF244321}">
+                <p14:modId xmlns:p14="http://schemas.microsoft.com/office/powerpoint/2010/main" val="603282979"/>
+              </p:ext>
+            </p:extLst>
+          </p:nvPr>
+        </p:nvGraphicFramePr>
+        <p:xfrm>
+          <a:off x="7062651" y="1826735"/>
+          <a:ext cx="2002972" cy="1690008"/>
+        </p:xfrm>
+        <a:graphic>
+          <a:graphicData uri="http://schemas.openxmlformats.org/presentationml/2006/ole">
+            <mc:AlternateContent xmlns:mc="http://schemas.openxmlformats.org/markup-compatibility/2006">
+              <mc:Choice xmlns:v="urn:schemas-microsoft-com:vml" Requires="v">
+                <p:oleObj spid="_x0000_s2053" name="Objeto empaquetador del shell" showAsIcon="1" r:id="rId3" imgW="914400" imgH="771480" progId="Package">
+                  <p:embed/>
+                </p:oleObj>
+              </mc:Choice>
+              <mc:Fallback>
+                <p:oleObj name="Objeto empaquetador del shell" showAsIcon="1" r:id="rId3" imgW="914400" imgH="771480" progId="Package">
+                  <p:embed/>
+                  <p:pic>
+                    <p:nvPicPr>
+                      <p:cNvPr id="0" name=""/>
+                      <p:cNvPicPr/>
+                      <p:nvPr/>
+                    </p:nvPicPr>
+                    <p:blipFill>
+                      <a:blip r:embed="rId4"/>
+                      <a:stretch>
+                        <a:fillRect/>
+                      </a:stretch>
+                    </p:blipFill>
+                    <p:spPr>
+                      <a:xfrm>
+                        <a:off x="7062651" y="1826735"/>
+                        <a:ext cx="2002972" cy="1690008"/>
+                      </a:xfrm>
+                      <a:prstGeom prst="rect">
+                        <a:avLst/>
+                      </a:prstGeom>
+                    </p:spPr>
+                  </p:pic>
+                </p:oleObj>
+              </mc:Fallback>
+            </mc:AlternateContent>
+          </a:graphicData>
+        </a:graphic>
+      </p:graphicFrame>
+      <p:pic>
+        <p:nvPicPr>
+          <p:cNvPr id="4" name="Imagen 3"/>
+          <p:cNvPicPr>
+            <a:picLocks noChangeAspect="1"/>
+          </p:cNvPicPr>
+          <p:nvPr/>
+        </p:nvPicPr>
+        <p:blipFill rotWithShape="1">
+          <a:blip r:embed="rId5"/>
+          <a:srcRect l="-402" t="1071" r="402" b="5089"/>
+          <a:stretch/>
+        </p:blipFill>
+        <p:spPr>
+          <a:xfrm>
+            <a:off x="817718" y="1826735"/>
+            <a:ext cx="5171195" cy="2728262"/>
+          </a:xfrm>
+          <a:prstGeom prst="rect">
+            <a:avLst/>
+          </a:prstGeom>
+        </p:spPr>
+      </p:pic>
+      <p:pic>
+        <p:nvPicPr>
+          <p:cNvPr id="5" name="Imagen 4"/>
+          <p:cNvPicPr>
+            <a:picLocks noChangeAspect="1"/>
+          </p:cNvPicPr>
+          <p:nvPr/>
+        </p:nvPicPr>
+        <p:blipFill rotWithShape="1">
+          <a:blip r:embed="rId6"/>
+          <a:srcRect b="5089"/>
+          <a:stretch/>
+        </p:blipFill>
+        <p:spPr>
+          <a:xfrm>
+            <a:off x="6304117" y="3799226"/>
+            <a:ext cx="5112819" cy="2728263"/>
+          </a:xfrm>
+          <a:prstGeom prst="rect">
+            <a:avLst/>
+          </a:prstGeom>
+        </p:spPr>
+      </p:pic>
     </p:spTree>
     <p:extLst>
       <p:ext uri="{BB962C8B-B14F-4D97-AF65-F5344CB8AC3E}">
@@ -14779,6 +15045,13 @@
   <p:clrMapOvr>
     <a:masterClrMapping/>
   </p:clrMapOvr>
+  <p:timing>
+    <p:tnLst>
+      <p:par>
+        <p:cTn id="1" dur="indefinite" restart="never" nodeType="tmRoot"/>
+      </p:par>
+    </p:tnLst>
+  </p:timing>
 </p:sld>
 </file>
 
@@ -14799,76 +15072,162 @@
           <a:chExt cx="0" cy="0"/>
         </a:xfrm>
       </p:grpSpPr>
+      <p:pic>
+        <p:nvPicPr>
+          <p:cNvPr id="6" name="Imagen 5"/>
+          <p:cNvPicPr>
+            <a:picLocks noChangeAspect="1"/>
+          </p:cNvPicPr>
+          <p:nvPr/>
+        </p:nvPicPr>
+        <p:blipFill>
+          <a:blip r:embed="rId3"/>
+          <a:stretch>
+            <a:fillRect/>
+          </a:stretch>
+        </p:blipFill>
+        <p:spPr>
+          <a:xfrm>
+            <a:off x="1326609" y="1064368"/>
+            <a:ext cx="8498356" cy="5232978"/>
+          </a:xfrm>
+          <a:prstGeom prst="rect">
+            <a:avLst/>
+          </a:prstGeom>
+        </p:spPr>
+      </p:pic>
       <p:sp>
         <p:nvSpPr>
-          <p:cNvPr id="3" name="Título 1">
+          <p:cNvPr id="7" name="Título 1">
             <a:extLst>
               <a:ext uri="{FF2B5EF4-FFF2-40B4-BE49-F238E27FC236}">
                 <a16:creationId xmlns:a16="http://schemas.microsoft.com/office/drawing/2014/main" id="{442F8CCE-B942-4590-912D-48FE0E35E5E7}"/>
               </a:ext>
             </a:extLst>
           </p:cNvPr>
-          <p:cNvSpPr>
-            <a:spLocks noGrp="1"/>
+          <p:cNvSpPr txBox="1">
+            <a:spLocks/>
           </p:cNvSpPr>
-          <p:nvPr>
-            <p:ph type="title"/>
-          </p:nvPr>
+          <p:nvPr/>
         </p:nvSpPr>
         <p:spPr>
           <a:xfrm>
-            <a:off x="1605580" y="842713"/>
+            <a:off x="1853007" y="303326"/>
             <a:ext cx="5171737" cy="846237"/>
-          </a:xfrm>
-        </p:spPr>
-        <p:txBody>
-          <a:bodyPr>
-            <a:normAutofit/>
-          </a:bodyPr>
-          <a:lstStyle/>
-          <a:p>
-            <a:r>
-              <a:rPr lang="es-MX" sz="3200" b="1" dirty="0" smtClean="0"/>
-              <a:t>SELECCIÓN DE PERSONAL</a:t>
-            </a:r>
-            <a:endParaRPr lang="es-CO" sz="3200" b="1" dirty="0"/>
-          </a:p>
-        </p:txBody>
-      </p:sp>
-      <p:pic>
-        <p:nvPicPr>
-          <p:cNvPr id="4" name="Imagen 3"/>
-          <p:cNvPicPr>
-            <a:picLocks noChangeAspect="1"/>
-          </p:cNvPicPr>
-          <p:nvPr/>
-        </p:nvPicPr>
-        <p:blipFill>
-          <a:blip r:embed="rId2"/>
-          <a:stretch>
-            <a:fillRect/>
-          </a:stretch>
-        </p:blipFill>
-        <p:spPr>
-          <a:xfrm>
-            <a:off x="1605580" y="1941754"/>
-            <a:ext cx="9515475" cy="4114800"/>
           </a:xfrm>
           <a:prstGeom prst="rect">
             <a:avLst/>
           </a:prstGeom>
         </p:spPr>
-      </p:pic>
+        <p:txBody>
+          <a:bodyPr vert="horz" lIns="91440" tIns="45720" rIns="91440" bIns="45720" rtlCol="0" anchor="ctr">
+            <a:normAutofit/>
+          </a:bodyPr>
+          <a:lstStyle>
+            <a:lvl1pPr algn="l" defTabSz="914400" rtl="0" eaLnBrk="1" latinLnBrk="0" hangingPunct="1">
+              <a:lnSpc>
+                <a:spcPct val="90000"/>
+              </a:lnSpc>
+              <a:spcBef>
+                <a:spcPct val="0"/>
+              </a:spcBef>
+              <a:buNone/>
+              <a:defRPr sz="3600" kern="1200" cap="all" baseline="0">
+                <a:solidFill>
+                  <a:schemeClr val="tx1"/>
+                </a:solidFill>
+                <a:latin typeface="+mj-lt"/>
+                <a:ea typeface="+mj-ea"/>
+                <a:cs typeface="+mj-cs"/>
+              </a:defRPr>
+            </a:lvl1pPr>
+          </a:lstStyle>
+          <a:p>
+            <a:r>
+              <a:rPr lang="es-MX" sz="3200" b="1" dirty="0" smtClean="0"/>
+              <a:t>DIAGRAMA DE GANTT</a:t>
+            </a:r>
+            <a:endParaRPr lang="es-CO" sz="3200" b="1" dirty="0"/>
+          </a:p>
+        </p:txBody>
+      </p:sp>
+      <p:graphicFrame>
+        <p:nvGraphicFramePr>
+          <p:cNvPr id="2" name="Objeto 1"/>
+          <p:cNvGraphicFramePr>
+            <a:graphicFrameLocks noChangeAspect="1"/>
+          </p:cNvGraphicFramePr>
+          <p:nvPr>
+            <p:extLst>
+              <p:ext uri="{D42A27DB-BD31-4B8C-83A1-F6EECF244321}">
+                <p14:modId xmlns:p14="http://schemas.microsoft.com/office/powerpoint/2010/main" val="2849840307"/>
+              </p:ext>
+            </p:extLst>
+          </p:nvPr>
+        </p:nvGraphicFramePr>
+        <p:xfrm>
+          <a:off x="10112770" y="5394960"/>
+          <a:ext cx="1504171" cy="1269144"/>
+        </p:xfrm>
+        <a:graphic>
+          <a:graphicData uri="http://schemas.openxmlformats.org/presentationml/2006/ole">
+            <mc:AlternateContent xmlns:mc="http://schemas.openxmlformats.org/markup-compatibility/2006">
+              <mc:Choice xmlns:v="urn:schemas-microsoft-com:vml" Requires="v">
+                <p:oleObj spid="_x0000_s3076" name="Project" showAsIcon="1" r:id="rId4" imgW="914400" imgH="771480" progId="MSProject.Project.9">
+                  <p:embed/>
+                </p:oleObj>
+              </mc:Choice>
+              <mc:Fallback>
+                <p:oleObj name="Project" showAsIcon="1" r:id="rId4" imgW="914400" imgH="771480" progId="MSProject.Project.9">
+                  <p:embed/>
+                  <p:pic>
+                    <p:nvPicPr>
+                      <p:cNvPr id="0" name=""/>
+                      <p:cNvPicPr/>
+                      <p:nvPr/>
+                    </p:nvPicPr>
+                    <p:blipFill>
+                      <a:blip r:embed="rId5"/>
+                      <a:stretch>
+                        <a:fillRect/>
+                      </a:stretch>
+                    </p:blipFill>
+                    <p:spPr>
+                      <a:xfrm>
+                        <a:off x="10112770" y="5394960"/>
+                        <a:ext cx="1504171" cy="1269144"/>
+                      </a:xfrm>
+                      <a:prstGeom prst="rect">
+                        <a:avLst/>
+                      </a:prstGeom>
+                      <a:solidFill>
+                        <a:schemeClr val="tx1"/>
+                      </a:solidFill>
+                    </p:spPr>
+                  </p:pic>
+                </p:oleObj>
+              </mc:Fallback>
+            </mc:AlternateContent>
+          </a:graphicData>
+        </a:graphic>
+      </p:graphicFrame>
     </p:spTree>
     <p:extLst>
       <p:ext uri="{BB962C8B-B14F-4D97-AF65-F5344CB8AC3E}">
-        <p14:creationId xmlns:p14="http://schemas.microsoft.com/office/powerpoint/2010/main" val="108380334"/>
+        <p14:creationId xmlns:p14="http://schemas.microsoft.com/office/powerpoint/2010/main" val="1213874458"/>
       </p:ext>
     </p:extLst>
   </p:cSld>
   <p:clrMapOvr>
     <a:masterClrMapping/>
   </p:clrMapOvr>
+  <p:timing>
+    <p:tnLst>
+      <p:par>
+        <p:cTn id="1" dur="indefinite" restart="never" nodeType="tmRoot"/>
+      </p:par>
+    </p:tnLst>
+  </p:timing>
 </p:sld>
 </file>
 
@@ -14889,70 +15248,6 @@
           <a:chExt cx="0" cy="0"/>
         </a:xfrm>
       </p:grpSpPr>
-      <p:sp>
-        <p:nvSpPr>
-          <p:cNvPr id="3" name="Título 1">
-            <a:extLst>
-              <a:ext uri="{FF2B5EF4-FFF2-40B4-BE49-F238E27FC236}">
-                <a16:creationId xmlns:a16="http://schemas.microsoft.com/office/drawing/2014/main" id="{442F8CCE-B942-4590-912D-48FE0E35E5E7}"/>
-              </a:ext>
-            </a:extLst>
-          </p:cNvPr>
-          <p:cNvSpPr>
-            <a:spLocks noGrp="1"/>
-          </p:cNvSpPr>
-          <p:nvPr>
-            <p:ph type="title"/>
-          </p:nvPr>
-        </p:nvSpPr>
-        <p:spPr>
-          <a:xfrm>
-            <a:off x="9478822" y="6243052"/>
-            <a:ext cx="1965957" cy="469719"/>
-          </a:xfrm>
-        </p:spPr>
-        <p:txBody>
-          <a:bodyPr>
-            <a:normAutofit fontScale="90000"/>
-          </a:bodyPr>
-          <a:lstStyle/>
-          <a:p>
-            <a:r>
-              <a:rPr lang="es-CO" b="1" dirty="0" smtClean="0">
-                <a:latin typeface="Algerian" panose="04020705040A02060702" pitchFamily="82" charset="0"/>
-              </a:rPr>
-              <a:t>PROJECT</a:t>
-            </a:r>
-            <a:endParaRPr lang="es-CO" b="1" dirty="0">
-              <a:latin typeface="Algerian" panose="04020705040A02060702" pitchFamily="82" charset="0"/>
-            </a:endParaRPr>
-          </a:p>
-        </p:txBody>
-      </p:sp>
-      <p:pic>
-        <p:nvPicPr>
-          <p:cNvPr id="4" name="Imagen 3"/>
-          <p:cNvPicPr>
-            <a:picLocks noChangeAspect="1"/>
-          </p:cNvPicPr>
-          <p:nvPr/>
-        </p:nvPicPr>
-        <p:blipFill>
-          <a:blip r:embed="rId2"/>
-          <a:stretch>
-            <a:fillRect/>
-          </a:stretch>
-        </p:blipFill>
-        <p:spPr>
-          <a:xfrm>
-            <a:off x="9948701" y="5642728"/>
-            <a:ext cx="789529" cy="536284"/>
-          </a:xfrm>
-          <a:prstGeom prst="rect">
-            <a:avLst/>
-          </a:prstGeom>
-        </p:spPr>
-      </p:pic>
       <p:pic>
         <p:nvPicPr>
           <p:cNvPr id="5" name="Imagen 4"/>
@@ -15032,6 +15327,66 @@
           </a:p>
         </p:txBody>
       </p:sp>
+      <p:graphicFrame>
+        <p:nvGraphicFramePr>
+          <p:cNvPr id="7" name="Objeto 6"/>
+          <p:cNvGraphicFramePr>
+            <a:graphicFrameLocks noChangeAspect="1"/>
+          </p:cNvGraphicFramePr>
+          <p:nvPr>
+            <p:extLst>
+              <p:ext uri="{D42A27DB-BD31-4B8C-83A1-F6EECF244321}">
+                <p14:modId xmlns:p14="http://schemas.microsoft.com/office/powerpoint/2010/main" val="19106599"/>
+              </p:ext>
+            </p:extLst>
+          </p:nvPr>
+        </p:nvGraphicFramePr>
+        <p:xfrm>
+          <a:off x="10507744" y="5747656"/>
+          <a:ext cx="1133610" cy="956483"/>
+        </p:xfrm>
+        <a:graphic>
+          <a:graphicData uri="http://schemas.openxmlformats.org/presentationml/2006/ole">
+            <mc:AlternateContent xmlns:mc="http://schemas.openxmlformats.org/markup-compatibility/2006">
+              <mc:Choice xmlns:v="urn:schemas-microsoft-com:vml" Requires="v">
+                <p:oleObj spid="_x0000_s4100" name="Project" showAsIcon="1" r:id="rId4" imgW="914400" imgH="771480" progId="MSProject.Project.9">
+                  <p:embed/>
+                </p:oleObj>
+              </mc:Choice>
+              <mc:Fallback>
+                <p:oleObj name="Project" showAsIcon="1" r:id="rId4" imgW="914400" imgH="771480" progId="MSProject.Project.9">
+                  <p:embed/>
+                  <p:pic>
+                    <p:nvPicPr>
+                      <p:cNvPr id="2" name="Objeto 1"/>
+                      <p:cNvPicPr/>
+                      <p:nvPr/>
+                    </p:nvPicPr>
+                    <p:blipFill>
+                      <a:blip r:embed="rId5"/>
+                      <a:stretch>
+                        <a:fillRect/>
+                      </a:stretch>
+                    </p:blipFill>
+                    <p:spPr>
+                      <a:xfrm>
+                        <a:off x="10507744" y="5747656"/>
+                        <a:ext cx="1133610" cy="956483"/>
+                      </a:xfrm>
+                      <a:prstGeom prst="rect">
+                        <a:avLst/>
+                      </a:prstGeom>
+                      <a:solidFill>
+                        <a:schemeClr val="tx1"/>
+                      </a:solidFill>
+                    </p:spPr>
+                  </p:pic>
+                </p:oleObj>
+              </mc:Fallback>
+            </mc:AlternateContent>
+          </a:graphicData>
+        </a:graphic>
+      </p:graphicFrame>
     </p:spTree>
     <p:extLst>
       <p:ext uri="{BB962C8B-B14F-4D97-AF65-F5344CB8AC3E}">
@@ -15042,6 +15397,13 @@
   <p:clrMapOvr>
     <a:masterClrMapping/>
   </p:clrMapOvr>
+  <p:timing>
+    <p:tnLst>
+      <p:par>
+        <p:cTn id="1" dur="indefinite" restart="never" nodeType="tmRoot"/>
+      </p:par>
+    </p:tnLst>
+  </p:timing>
 </p:sld>
 </file>
 
@@ -15062,6 +15424,42 @@
           <a:chExt cx="0" cy="0"/>
         </a:xfrm>
       </p:grpSpPr>
+      <p:sp>
+        <p:nvSpPr>
+          <p:cNvPr id="3" name="Título 1">
+            <a:extLst>
+              <a:ext uri="{FF2B5EF4-FFF2-40B4-BE49-F238E27FC236}">
+                <a16:creationId xmlns:a16="http://schemas.microsoft.com/office/drawing/2014/main" id="{442F8CCE-B942-4590-912D-48FE0E35E5E7}"/>
+              </a:ext>
+            </a:extLst>
+          </p:cNvPr>
+          <p:cNvSpPr>
+            <a:spLocks noGrp="1"/>
+          </p:cNvSpPr>
+          <p:nvPr>
+            <p:ph type="title"/>
+          </p:nvPr>
+        </p:nvSpPr>
+        <p:spPr>
+          <a:xfrm>
+            <a:off x="1605580" y="842713"/>
+            <a:ext cx="5171737" cy="846237"/>
+          </a:xfrm>
+        </p:spPr>
+        <p:txBody>
+          <a:bodyPr>
+            <a:normAutofit/>
+          </a:bodyPr>
+          <a:lstStyle/>
+          <a:p>
+            <a:r>
+              <a:rPr lang="es-MX" sz="3200" b="1" dirty="0" smtClean="0"/>
+              <a:t>SELECCIÓN DE PERSONAL</a:t>
+            </a:r>
+            <a:endParaRPr lang="es-CO" sz="3200" b="1" dirty="0"/>
+          </a:p>
+        </p:txBody>
+      </p:sp>
       <p:pic>
         <p:nvPicPr>
           <p:cNvPr id="4" name="Imagen 3"/>
@@ -15078,156 +15476,220 @@
         </p:blipFill>
         <p:spPr>
           <a:xfrm>
-            <a:off x="9948699" y="5761062"/>
-            <a:ext cx="789529" cy="536284"/>
+            <a:off x="1605580" y="1941754"/>
+            <a:ext cx="9515475" cy="4114800"/>
           </a:xfrm>
           <a:prstGeom prst="rect">
             <a:avLst/>
           </a:prstGeom>
         </p:spPr>
       </p:pic>
+    </p:spTree>
+    <p:extLst>
+      <p:ext uri="{BB962C8B-B14F-4D97-AF65-F5344CB8AC3E}">
+        <p14:creationId xmlns:p14="http://schemas.microsoft.com/office/powerpoint/2010/main" val="108380334"/>
+      </p:ext>
+    </p:extLst>
+  </p:cSld>
+  <p:clrMapOvr>
+    <a:masterClrMapping/>
+  </p:clrMapOvr>
+  <p:timing>
+    <p:tnLst>
+      <p:par>
+        <p:cTn id="1" dur="indefinite" restart="never" nodeType="tmRoot"/>
+      </p:par>
+    </p:tnLst>
+  </p:timing>
+</p:sld>
+</file>
+
+<file path=ppt/slides/slide27.xml><?xml version="1.0" encoding="utf-8"?>
+<p:sld xmlns:a="http://schemas.openxmlformats.org/drawingml/2006/main" xmlns:r="http://schemas.openxmlformats.org/officeDocument/2006/relationships" xmlns:p="http://schemas.openxmlformats.org/presentationml/2006/main">
+  <p:cSld>
+    <p:spTree>
+      <p:nvGrpSpPr>
+        <p:cNvPr id="1" name=""/>
+        <p:cNvGrpSpPr/>
+        <p:nvPr/>
+      </p:nvGrpSpPr>
+      <p:grpSpPr>
+        <a:xfrm>
+          <a:off x="0" y="0"/>
+          <a:ext cx="0" cy="0"/>
+          <a:chOff x="0" y="0"/>
+          <a:chExt cx="0" cy="0"/>
+        </a:xfrm>
+      </p:grpSpPr>
       <p:sp>
         <p:nvSpPr>
-          <p:cNvPr id="5" name="Título 1">
-            <a:extLst>
-              <a:ext uri="{FF2B5EF4-FFF2-40B4-BE49-F238E27FC236}">
-                <a16:creationId xmlns:a16="http://schemas.microsoft.com/office/drawing/2014/main" id="{442F8CCE-B942-4590-912D-48FE0E35E5E7}"/>
-              </a:ext>
-            </a:extLst>
-          </p:cNvPr>
-          <p:cNvSpPr txBox="1">
-            <a:spLocks/>
+          <p:cNvPr id="3" name="Título 2"/>
+          <p:cNvSpPr>
+            <a:spLocks noGrp="1"/>
           </p:cNvSpPr>
-          <p:nvPr/>
+          <p:nvPr>
+            <p:ph type="title"/>
+          </p:nvPr>
         </p:nvSpPr>
-        <p:spPr>
-          <a:xfrm>
-            <a:off x="9360486" y="6388281"/>
-            <a:ext cx="1965957" cy="469719"/>
-          </a:xfrm>
-          <a:prstGeom prst="rect">
-            <a:avLst/>
-          </a:prstGeom>
-        </p:spPr>
+        <p:spPr/>
         <p:txBody>
-          <a:bodyPr vert="horz" lIns="91440" tIns="45720" rIns="91440" bIns="45720" rtlCol="0" anchor="ctr">
-            <a:normAutofit fontScale="90000" lnSpcReduction="20000"/>
-          </a:bodyPr>
-          <a:lstStyle>
-            <a:lvl1pPr algn="l" defTabSz="914400" rtl="0" eaLnBrk="1" latinLnBrk="0" hangingPunct="1">
-              <a:lnSpc>
-                <a:spcPct val="90000"/>
-              </a:lnSpc>
-              <a:spcBef>
-                <a:spcPct val="0"/>
-              </a:spcBef>
-              <a:buNone/>
-              <a:defRPr sz="3600" kern="1200" cap="all" baseline="0">
-                <a:solidFill>
-                  <a:schemeClr val="tx1"/>
-                </a:solidFill>
-                <a:latin typeface="+mj-lt"/>
-                <a:ea typeface="+mj-ea"/>
-                <a:cs typeface="+mj-cs"/>
-              </a:defRPr>
-            </a:lvl1pPr>
-          </a:lstStyle>
+          <a:bodyPr/>
+          <a:lstStyle/>
           <a:p>
             <a:r>
-              <a:rPr lang="es-CO" b="1" dirty="0" smtClean="0">
-                <a:latin typeface="Algerian" panose="04020705040A02060702" pitchFamily="82" charset="0"/>
-              </a:rPr>
-              <a:t>PROJECT</a:t>
+              <a:rPr lang="es-CO" b="1" cap="none" dirty="0" smtClean="0"/>
+              <a:t>BIBLIOGRAFÍA</a:t>
             </a:r>
-            <a:endParaRPr lang="es-CO" b="1" dirty="0">
-              <a:latin typeface="Algerian" panose="04020705040A02060702" pitchFamily="82" charset="0"/>
-            </a:endParaRPr>
+            <a:endParaRPr lang="en-US" b="1" cap="none" dirty="0"/>
           </a:p>
         </p:txBody>
       </p:sp>
-      <p:pic>
-        <p:nvPicPr>
-          <p:cNvPr id="6" name="Imagen 5"/>
-          <p:cNvPicPr>
-            <a:picLocks noChangeAspect="1"/>
-          </p:cNvPicPr>
-          <p:nvPr/>
-        </p:nvPicPr>
-        <p:blipFill>
-          <a:blip r:embed="rId3"/>
-          <a:stretch>
-            <a:fillRect/>
-          </a:stretch>
-        </p:blipFill>
-        <p:spPr>
-          <a:xfrm>
-            <a:off x="1326609" y="1064368"/>
-            <a:ext cx="8498356" cy="5232978"/>
-          </a:xfrm>
-          <a:prstGeom prst="rect">
-            <a:avLst/>
-          </a:prstGeom>
-        </p:spPr>
-      </p:pic>
       <p:sp>
         <p:nvSpPr>
-          <p:cNvPr id="7" name="Título 1">
-            <a:extLst>
-              <a:ext uri="{FF2B5EF4-FFF2-40B4-BE49-F238E27FC236}">
-                <a16:creationId xmlns:a16="http://schemas.microsoft.com/office/drawing/2014/main" id="{442F8CCE-B942-4590-912D-48FE0E35E5E7}"/>
-              </a:ext>
-            </a:extLst>
-          </p:cNvPr>
-          <p:cNvSpPr txBox="1">
-            <a:spLocks/>
+          <p:cNvPr id="4" name="Marcador de contenido 3"/>
+          <p:cNvSpPr>
+            <a:spLocks noGrp="1"/>
           </p:cNvSpPr>
-          <p:nvPr/>
+          <p:nvPr>
+            <p:ph idx="1"/>
+          </p:nvPr>
         </p:nvSpPr>
-        <p:spPr>
-          <a:xfrm>
-            <a:off x="1853007" y="303326"/>
-            <a:ext cx="5171737" cy="846237"/>
-          </a:xfrm>
-          <a:prstGeom prst="rect">
-            <a:avLst/>
-          </a:prstGeom>
-        </p:spPr>
+        <p:spPr/>
         <p:txBody>
-          <a:bodyPr vert="horz" lIns="91440" tIns="45720" rIns="91440" bIns="45720" rtlCol="0" anchor="ctr">
-            <a:normAutofit/>
-          </a:bodyPr>
-          <a:lstStyle>
-            <a:lvl1pPr algn="l" defTabSz="914400" rtl="0" eaLnBrk="1" latinLnBrk="0" hangingPunct="1">
-              <a:lnSpc>
-                <a:spcPct val="90000"/>
-              </a:lnSpc>
-              <a:spcBef>
-                <a:spcPct val="0"/>
-              </a:spcBef>
-              <a:buNone/>
-              <a:defRPr sz="3600" kern="1200" cap="all" baseline="0">
-                <a:solidFill>
-                  <a:schemeClr val="tx1"/>
-                </a:solidFill>
-                <a:latin typeface="+mj-lt"/>
-                <a:ea typeface="+mj-ea"/>
-                <a:cs typeface="+mj-cs"/>
-              </a:defRPr>
-            </a:lvl1pPr>
-          </a:lstStyle>
+          <a:bodyPr/>
+          <a:lstStyle/>
           <a:p>
             <a:r>
-              <a:rPr lang="es-MX" sz="3200" b="1" dirty="0" smtClean="0"/>
-              <a:t>DIAGRAMA DE GANTT</a:t>
+              <a:rPr lang="en-US">
+                <a:hlinkClick r:id="rId2"/>
+              </a:rPr>
+              <a:t>https</a:t>
             </a:r>
-            <a:endParaRPr lang="es-CO" sz="3200" b="1" dirty="0"/>
+            <a:r>
+              <a:rPr lang="en-US">
+                <a:hlinkClick r:id="rId2"/>
+              </a:rPr>
+              <a:t>://</a:t>
+            </a:r>
+            <a:r>
+              <a:rPr lang="en-US" smtClean="0">
+                <a:hlinkClick r:id="rId2"/>
+              </a:rPr>
+              <a:t>www.google.com.co/imghp?hl=es&amp;tab=wi&amp;authuser=0&amp;ogbl</a:t>
+            </a:r>
+            <a:endParaRPr lang="en-US" smtClean="0"/>
+          </a:p>
+          <a:p>
+            <a:endParaRPr lang="en-US" dirty="0"/>
           </a:p>
         </p:txBody>
       </p:sp>
     </p:spTree>
     <p:extLst>
       <p:ext uri="{BB962C8B-B14F-4D97-AF65-F5344CB8AC3E}">
-        <p14:creationId xmlns:p14="http://schemas.microsoft.com/office/powerpoint/2010/main" val="1213874458"/>
+        <p14:creationId xmlns:p14="http://schemas.microsoft.com/office/powerpoint/2010/main" val="1526102271"/>
+      </p:ext>
+    </p:extLst>
+  </p:cSld>
+  <p:clrMapOvr>
+    <a:masterClrMapping/>
+  </p:clrMapOvr>
+  <p:timing>
+    <p:tnLst>
+      <p:par>
+        <p:cTn id="1" dur="indefinite" restart="never" nodeType="tmRoot"/>
+      </p:par>
+    </p:tnLst>
+  </p:timing>
+</p:sld>
+</file>
+
+<file path=ppt/slides/slide3.xml><?xml version="1.0" encoding="utf-8"?>
+<p:sld xmlns:a="http://schemas.openxmlformats.org/drawingml/2006/main" xmlns:r="http://schemas.openxmlformats.org/officeDocument/2006/relationships" xmlns:p="http://schemas.openxmlformats.org/presentationml/2006/main">
+  <p:cSld>
+    <p:spTree>
+      <p:nvGrpSpPr>
+        <p:cNvPr id="1" name=""/>
+        <p:cNvGrpSpPr/>
+        <p:nvPr/>
+      </p:nvGrpSpPr>
+      <p:grpSpPr>
+        <a:xfrm>
+          <a:off x="0" y="0"/>
+          <a:ext cx="0" cy="0"/>
+          <a:chOff x="0" y="0"/>
+          <a:chExt cx="0" cy="0"/>
+        </a:xfrm>
+      </p:grpSpPr>
+      <p:sp>
+        <p:nvSpPr>
+          <p:cNvPr id="2" name="Título 1"/>
+          <p:cNvSpPr>
+            <a:spLocks noGrp="1"/>
+          </p:cNvSpPr>
+          <p:nvPr>
+            <p:ph type="title"/>
+          </p:nvPr>
+        </p:nvSpPr>
+        <p:spPr/>
+        <p:txBody>
+          <a:bodyPr>
+            <a:normAutofit/>
+          </a:bodyPr>
+          <a:lstStyle/>
+          <a:p>
+            <a:r>
+              <a:rPr lang="es-CO" b="1" dirty="0">
+                <a:effectLst/>
+                <a:latin typeface="Century Gothic" panose="020B0502020202020204" pitchFamily="34" charset="0"/>
+              </a:rPr>
+              <a:t>OBJETIVO GENERAL</a:t>
+            </a:r>
+            <a:endParaRPr lang="es-CO" b="1" dirty="0">
+              <a:latin typeface="Century Gothic" panose="020B0502020202020204" pitchFamily="34" charset="0"/>
+            </a:endParaRPr>
+          </a:p>
+        </p:txBody>
+      </p:sp>
+      <p:sp>
+        <p:nvSpPr>
+          <p:cNvPr id="3" name="Marcador de contenido 2"/>
+          <p:cNvSpPr>
+            <a:spLocks noGrp="1"/>
+          </p:cNvSpPr>
+          <p:nvPr>
+            <p:ph idx="1"/>
+          </p:nvPr>
+        </p:nvSpPr>
+        <p:spPr/>
+        <p:txBody>
+          <a:bodyPr>
+            <a:normAutofit/>
+          </a:bodyPr>
+          <a:lstStyle/>
+          <a:p>
+            <a:pPr marL="0" indent="0">
+              <a:buNone/>
+            </a:pPr>
+            <a:r>
+              <a:rPr lang="es-CO" sz="2800" dirty="0">
+                <a:effectLst/>
+                <a:latin typeface="Century Gothic" panose="020B0502020202020204" pitchFamily="34" charset="0"/>
+              </a:rPr>
+              <a:t>Desarrollar un software de encendido biométrico para vehículos por medio de una huella dactilar brindando de esa manera una mayor seguridad para el usuario</a:t>
+            </a:r>
+          </a:p>
+          <a:p>
+            <a:endParaRPr lang="es-CO" sz="3200" dirty="0">
+              <a:latin typeface="Century Gothic" panose="020B0502020202020204" pitchFamily="34" charset="0"/>
+            </a:endParaRPr>
+          </a:p>
+        </p:txBody>
+      </p:sp>
+    </p:spTree>
+    <p:extLst>
+      <p:ext uri="{BB962C8B-B14F-4D97-AF65-F5344CB8AC3E}">
+        <p14:creationId xmlns:p14="http://schemas.microsoft.com/office/powerpoint/2010/main" val="2729265752"/>
       </p:ext>
     </p:extLst>
   </p:cSld>
@@ -15237,7 +15699,7 @@
 </p:sld>
 </file>
 
-<file path=ppt/slides/slide3.xml><?xml version="1.0" encoding="utf-8"?>
+<file path=ppt/slides/slide4.xml><?xml version="1.0" encoding="utf-8"?>
 <p:sld xmlns:a="http://schemas.openxmlformats.org/drawingml/2006/main" xmlns:r="http://schemas.openxmlformats.org/officeDocument/2006/relationships" xmlns:p="http://schemas.openxmlformats.org/presentationml/2006/main">
   <p:cSld>
     <p:spTree>
@@ -15280,8 +15742,8 @@
               <a:t>Objetivos </a:t>
             </a:r>
             <a:r>
-              <a:rPr lang="es-MX" dirty="0" err="1"/>
-              <a:t>especificos</a:t>
+              <a:rPr lang="es-MX" dirty="0" smtClean="0"/>
+              <a:t>específicos</a:t>
             </a:r>
             <a:endParaRPr lang="es-CO" dirty="0"/>
           </a:p>
@@ -15375,258 +15837,7 @@
 </p:sld>
 </file>
 
-<file path=ppt/slides/slide4.xml><?xml version="1.0" encoding="utf-8"?>
-<p:sld xmlns:a="http://schemas.openxmlformats.org/drawingml/2006/main" xmlns:r="http://schemas.openxmlformats.org/officeDocument/2006/relationships" xmlns:p="http://schemas.openxmlformats.org/presentationml/2006/main">
-  <p:cSld>
-    <p:spTree>
-      <p:nvGrpSpPr>
-        <p:cNvPr id="1" name=""/>
-        <p:cNvGrpSpPr/>
-        <p:nvPr/>
-      </p:nvGrpSpPr>
-      <p:grpSpPr>
-        <a:xfrm>
-          <a:off x="0" y="0"/>
-          <a:ext cx="0" cy="0"/>
-          <a:chOff x="0" y="0"/>
-          <a:chExt cx="0" cy="0"/>
-        </a:xfrm>
-      </p:grpSpPr>
-      <p:sp>
-        <p:nvSpPr>
-          <p:cNvPr id="13" name="Título 12">
-            <a:extLst>
-              <a:ext uri="{FF2B5EF4-FFF2-40B4-BE49-F238E27FC236}">
-                <a16:creationId xmlns:a16="http://schemas.microsoft.com/office/drawing/2014/main" id="{F8519A5C-2200-4DD7-8891-8B0AFCE20B24}"/>
-              </a:ext>
-            </a:extLst>
-          </p:cNvPr>
-          <p:cNvSpPr>
-            <a:spLocks noGrp="1"/>
-          </p:cNvSpPr>
-          <p:nvPr>
-            <p:ph type="title"/>
-          </p:nvPr>
-        </p:nvSpPr>
-        <p:spPr/>
-        <p:txBody>
-          <a:bodyPr/>
-          <a:lstStyle/>
-          <a:p>
-            <a:r>
-              <a:rPr lang="es-419" b="1" dirty="0">
-                <a:solidFill>
-                  <a:sysClr val="window" lastClr="FFFFFF"/>
-                </a:solidFill>
-                <a:latin typeface="Century Gothic" panose="020B0502020202020204"/>
-              </a:rPr>
-              <a:t>MISIÓN</a:t>
-            </a:r>
-            <a:endParaRPr lang="es-CO" dirty="0"/>
-          </a:p>
-        </p:txBody>
-      </p:sp>
-      <p:sp>
-        <p:nvSpPr>
-          <p:cNvPr id="14" name="Marcador de contenido 13">
-            <a:extLst>
-              <a:ext uri="{FF2B5EF4-FFF2-40B4-BE49-F238E27FC236}">
-                <a16:creationId xmlns:a16="http://schemas.microsoft.com/office/drawing/2014/main" id="{C1D8EEED-38B8-47C6-AB6B-DFEA9509738E}"/>
-              </a:ext>
-            </a:extLst>
-          </p:cNvPr>
-          <p:cNvSpPr>
-            <a:spLocks noGrp="1"/>
-          </p:cNvSpPr>
-          <p:nvPr>
-            <p:ph idx="1"/>
-          </p:nvPr>
-        </p:nvSpPr>
-        <p:spPr/>
-        <p:txBody>
-          <a:bodyPr/>
-          <a:lstStyle/>
-          <a:p>
-            <a:pPr marL="0" lvl="0" indent="0" algn="just" defTabSz="457200">
-              <a:lnSpc>
-                <a:spcPct val="100000"/>
-              </a:lnSpc>
-              <a:buClr>
-                <a:srgbClr val="1E5155">
-                  <a:lumMod val="40000"/>
-                  <a:lumOff val="60000"/>
-                </a:srgbClr>
-              </a:buClr>
-              <a:buSzPct val="80000"/>
-              <a:buNone/>
-              <a:defRPr/>
-            </a:pPr>
-            <a:r>
-              <a:rPr lang="es-419" dirty="0">
-                <a:solidFill>
-                  <a:sysClr val="window" lastClr="FFFFFF"/>
-                </a:solidFill>
-                <a:latin typeface="Century Gothic" panose="020B0502020202020204"/>
-              </a:rPr>
-              <a:t>Ofrecer soluciones para la seguridad de encendido y apertura de vehículos, por huella dactilar, aplicando tecnologías contando con el talento de personal altamente calificado para ofrecer a nuestros clientes sistemas de seguridad</a:t>
-            </a:r>
-            <a:br>
-              <a:rPr lang="es-419" dirty="0">
-                <a:solidFill>
-                  <a:sysClr val="window" lastClr="FFFFFF"/>
-                </a:solidFill>
-                <a:latin typeface="Century Gothic" panose="020B0502020202020204"/>
-              </a:rPr>
-            </a:br>
-            <a:r>
-              <a:rPr lang="es-419" dirty="0">
-                <a:solidFill>
-                  <a:sysClr val="window" lastClr="FFFFFF"/>
-                </a:solidFill>
-                <a:latin typeface="Century Gothic" panose="020B0502020202020204"/>
-              </a:rPr>
-              <a:t> </a:t>
-            </a:r>
-          </a:p>
-          <a:p>
-            <a:endParaRPr lang="es-CO" dirty="0"/>
-          </a:p>
-        </p:txBody>
-      </p:sp>
-    </p:spTree>
-    <p:extLst>
-      <p:ext uri="{BB962C8B-B14F-4D97-AF65-F5344CB8AC3E}">
-        <p14:creationId xmlns:p14="http://schemas.microsoft.com/office/powerpoint/2010/main" val="126748087"/>
-      </p:ext>
-    </p:extLst>
-  </p:cSld>
-  <p:clrMapOvr>
-    <a:masterClrMapping/>
-  </p:clrMapOvr>
-</p:sld>
-</file>
-
 <file path=ppt/slides/slide5.xml><?xml version="1.0" encoding="utf-8"?>
-<p:sld xmlns:a="http://schemas.openxmlformats.org/drawingml/2006/main" xmlns:r="http://schemas.openxmlformats.org/officeDocument/2006/relationships" xmlns:p="http://schemas.openxmlformats.org/presentationml/2006/main">
-  <p:cSld>
-    <p:spTree>
-      <p:nvGrpSpPr>
-        <p:cNvPr id="1" name=""/>
-        <p:cNvGrpSpPr/>
-        <p:nvPr/>
-      </p:nvGrpSpPr>
-      <p:grpSpPr>
-        <a:xfrm>
-          <a:off x="0" y="0"/>
-          <a:ext cx="0" cy="0"/>
-          <a:chOff x="0" y="0"/>
-          <a:chExt cx="0" cy="0"/>
-        </a:xfrm>
-      </p:grpSpPr>
-      <p:sp>
-        <p:nvSpPr>
-          <p:cNvPr id="3" name="Título 2">
-            <a:extLst>
-              <a:ext uri="{FF2B5EF4-FFF2-40B4-BE49-F238E27FC236}">
-                <a16:creationId xmlns:a16="http://schemas.microsoft.com/office/drawing/2014/main" id="{A851FBFC-6729-49B3-9598-0C6274BF1C14}"/>
-              </a:ext>
-            </a:extLst>
-          </p:cNvPr>
-          <p:cNvSpPr>
-            <a:spLocks noGrp="1"/>
-          </p:cNvSpPr>
-          <p:nvPr>
-            <p:ph type="title"/>
-          </p:nvPr>
-        </p:nvSpPr>
-        <p:spPr/>
-        <p:txBody>
-          <a:bodyPr/>
-          <a:lstStyle/>
-          <a:p>
-            <a:r>
-              <a:rPr lang="es-419" b="1" dirty="0">
-                <a:solidFill>
-                  <a:sysClr val="window" lastClr="FFFFFF"/>
-                </a:solidFill>
-                <a:latin typeface="Century Gothic" panose="020B0502020202020204"/>
-              </a:rPr>
-              <a:t>VISIÓN</a:t>
-            </a:r>
-            <a:endParaRPr lang="es-CO" dirty="0"/>
-          </a:p>
-        </p:txBody>
-      </p:sp>
-      <p:sp>
-        <p:nvSpPr>
-          <p:cNvPr id="4" name="Marcador de contenido 3">
-            <a:extLst>
-              <a:ext uri="{FF2B5EF4-FFF2-40B4-BE49-F238E27FC236}">
-                <a16:creationId xmlns:a16="http://schemas.microsoft.com/office/drawing/2014/main" id="{16AC323A-3937-4B9F-A0D2-AB9D26BD24AB}"/>
-              </a:ext>
-            </a:extLst>
-          </p:cNvPr>
-          <p:cNvSpPr>
-            <a:spLocks noGrp="1"/>
-          </p:cNvSpPr>
-          <p:nvPr>
-            <p:ph idx="1"/>
-          </p:nvPr>
-        </p:nvSpPr>
-        <p:spPr/>
-        <p:txBody>
-          <a:bodyPr/>
-          <a:lstStyle/>
-          <a:p>
-            <a:pPr marL="0" lvl="0" indent="0" algn="just" defTabSz="457200">
-              <a:lnSpc>
-                <a:spcPct val="100000"/>
-              </a:lnSpc>
-              <a:buClr>
-                <a:srgbClr val="1E5155">
-                  <a:lumMod val="40000"/>
-                  <a:lumOff val="60000"/>
-                </a:srgbClr>
-              </a:buClr>
-              <a:buSzPct val="80000"/>
-              <a:buNone/>
-              <a:defRPr/>
-            </a:pPr>
-            <a:r>
-              <a:rPr lang="es-419" dirty="0">
-                <a:solidFill>
-                  <a:sysClr val="window" lastClr="FFFFFF"/>
-                </a:solidFill>
-                <a:latin typeface="Century Gothic" panose="020B0502020202020204"/>
-              </a:rPr>
-              <a:t>Ser reconocidos a nivel mundial como el referente de encendido biométrico , seguridad automotriz, generando tranquilidad y conformidad a nuestros clientes.</a:t>
-            </a:r>
-            <a:endParaRPr lang="en-US" dirty="0">
-              <a:solidFill>
-                <a:sysClr val="window" lastClr="FFFFFF"/>
-              </a:solidFill>
-              <a:latin typeface="Century Gothic" panose="020B0502020202020204"/>
-            </a:endParaRPr>
-          </a:p>
-          <a:p>
-            <a:endParaRPr lang="es-CO" dirty="0"/>
-          </a:p>
-        </p:txBody>
-      </p:sp>
-    </p:spTree>
-    <p:extLst>
-      <p:ext uri="{BB962C8B-B14F-4D97-AF65-F5344CB8AC3E}">
-        <p14:creationId xmlns:p14="http://schemas.microsoft.com/office/powerpoint/2010/main" val="1442419007"/>
-      </p:ext>
-    </p:extLst>
-  </p:cSld>
-  <p:clrMapOvr>
-    <a:masterClrMapping/>
-  </p:clrMapOvr>
-</p:sld>
-</file>
-
-<file path=ppt/slides/slide6.xml><?xml version="1.0" encoding="utf-8"?>
 <p:sld xmlns:a="http://schemas.openxmlformats.org/drawingml/2006/main" xmlns:r="http://schemas.openxmlformats.org/officeDocument/2006/relationships" xmlns:p="http://schemas.openxmlformats.org/presentationml/2006/main">
   <p:cSld>
     <p:spTree>
@@ -15715,7 +15926,7 @@
 </p:sld>
 </file>
 
-<file path=ppt/slides/slide7.xml><?xml version="1.0" encoding="utf-8"?>
+<file path=ppt/slides/slide6.xml><?xml version="1.0" encoding="utf-8"?>
 <p:sld xmlns:a="http://schemas.openxmlformats.org/drawingml/2006/main" xmlns:r="http://schemas.openxmlformats.org/officeDocument/2006/relationships" xmlns:p="http://schemas.openxmlformats.org/presentationml/2006/main">
   <p:cSld>
     <p:spTree>
@@ -16066,7 +16277,7 @@
 </p:sld>
 </file>
 
-<file path=ppt/slides/slide8.xml><?xml version="1.0" encoding="utf-8"?>
+<file path=ppt/slides/slide7.xml><?xml version="1.0" encoding="utf-8"?>
 <p:sld xmlns:a="http://schemas.openxmlformats.org/drawingml/2006/main" xmlns:r="http://schemas.openxmlformats.org/officeDocument/2006/relationships" xmlns:p="http://schemas.openxmlformats.org/presentationml/2006/main">
   <p:cSld>
     <p:spTree>
@@ -16154,6 +16365,95 @@
     <p:extLst>
       <p:ext uri="{BB962C8B-B14F-4D97-AF65-F5344CB8AC3E}">
         <p14:creationId xmlns:p14="http://schemas.microsoft.com/office/powerpoint/2010/main" val="2996172330"/>
+      </p:ext>
+    </p:extLst>
+  </p:cSld>
+  <p:clrMapOvr>
+    <a:masterClrMapping/>
+  </p:clrMapOvr>
+</p:sld>
+</file>
+
+<file path=ppt/slides/slide8.xml><?xml version="1.0" encoding="utf-8"?>
+<p:sld xmlns:a="http://schemas.openxmlformats.org/drawingml/2006/main" xmlns:r="http://schemas.openxmlformats.org/officeDocument/2006/relationships" xmlns:p="http://schemas.openxmlformats.org/presentationml/2006/main">
+  <p:cSld>
+    <p:spTree>
+      <p:nvGrpSpPr>
+        <p:cNvPr id="1" name=""/>
+        <p:cNvGrpSpPr/>
+        <p:nvPr/>
+      </p:nvGrpSpPr>
+      <p:grpSpPr>
+        <a:xfrm>
+          <a:off x="0" y="0"/>
+          <a:ext cx="0" cy="0"/>
+          <a:chOff x="0" y="0"/>
+          <a:chExt cx="0" cy="0"/>
+        </a:xfrm>
+      </p:grpSpPr>
+      <p:sp>
+        <p:nvSpPr>
+          <p:cNvPr id="4" name="Título 3">
+            <a:extLst>
+              <a:ext uri="{FF2B5EF4-FFF2-40B4-BE49-F238E27FC236}">
+                <a16:creationId xmlns:a16="http://schemas.microsoft.com/office/drawing/2014/main" id="{AC2194CF-E1B3-4E62-92A2-680F7E1B4836}"/>
+              </a:ext>
+            </a:extLst>
+          </p:cNvPr>
+          <p:cNvSpPr>
+            <a:spLocks noGrp="1"/>
+          </p:cNvSpPr>
+          <p:nvPr>
+            <p:ph type="title"/>
+          </p:nvPr>
+        </p:nvSpPr>
+        <p:spPr/>
+        <p:txBody>
+          <a:bodyPr/>
+          <a:lstStyle/>
+          <a:p>
+            <a:r>
+              <a:rPr lang="es-CO" b="1" dirty="0">
+                <a:latin typeface="Century Gothic" panose="020B0502020202020204" pitchFamily="34" charset="0"/>
+              </a:rPr>
+              <a:t>Alcance</a:t>
+            </a:r>
+          </a:p>
+        </p:txBody>
+      </p:sp>
+      <p:sp>
+        <p:nvSpPr>
+          <p:cNvPr id="3" name="Marcador de contenido 2"/>
+          <p:cNvSpPr>
+            <a:spLocks noGrp="1"/>
+          </p:cNvSpPr>
+          <p:nvPr>
+            <p:ph idx="1"/>
+          </p:nvPr>
+        </p:nvSpPr>
+        <p:spPr/>
+        <p:txBody>
+          <a:bodyPr>
+            <a:normAutofit/>
+          </a:bodyPr>
+          <a:lstStyle/>
+          <a:p>
+            <a:pPr marL="0" indent="0">
+              <a:buNone/>
+            </a:pPr>
+            <a:r>
+              <a:rPr lang="es-CO" sz="2800" dirty="0">
+                <a:latin typeface="Century Gothic" panose="020B0502020202020204" pitchFamily="34" charset="0"/>
+              </a:rPr>
+              <a:t>Mejorar la seguridad en vehículos a través  de un sistema de encendido biométrico del automotor, el cual este apoyado por un software en el que se podrá realizar monitoreo vía GPS para localizar los vehículos registrados.</a:t>
+            </a:r>
+          </a:p>
+        </p:txBody>
+      </p:sp>
+    </p:spTree>
+    <p:extLst>
+      <p:ext uri="{BB962C8B-B14F-4D97-AF65-F5344CB8AC3E}">
+        <p14:creationId xmlns:p14="http://schemas.microsoft.com/office/powerpoint/2010/main" val="1661043369"/>
       </p:ext>
     </p:extLst>
   </p:cSld>

</xml_diff>